<commit_message>
Change in req file
</commit_message>
<xml_diff>
--- a/Document/Panel Docs/AiZen-MOURI Tech's ION-Hacakthon 2020 Ppt Format.pptx
+++ b/Document/Panel Docs/AiZen-MOURI Tech's ION-Hacakthon 2020 Ppt Format.pptx
@@ -197,7 +197,7 @@
           <p:cNvPr id="2" name="Header Placeholder 1">
             <a:extLst>
               <a:ext uri="{FF2B5EF4-FFF2-40B4-BE49-F238E27FC236}">
-                <a16:creationId xmlns="" xmlns:a16="http://schemas.microsoft.com/office/drawing/2014/main" id="{A74BB007-E583-46C9-9932-282F7CF3FE91}"/>
+                <a16:creationId xmlns:a16="http://schemas.microsoft.com/office/drawing/2014/main" xmlns="" id="{A74BB007-E583-46C9-9932-282F7CF3FE91}"/>
               </a:ext>
             </a:extLst>
           </p:cNvPr>
@@ -234,7 +234,7 @@
           <p:cNvPr id="3" name="Date Placeholder 2">
             <a:extLst>
               <a:ext uri="{FF2B5EF4-FFF2-40B4-BE49-F238E27FC236}">
-                <a16:creationId xmlns="" xmlns:a16="http://schemas.microsoft.com/office/drawing/2014/main" id="{208B8086-02CF-4961-8386-8175387516DA}"/>
+                <a16:creationId xmlns:a16="http://schemas.microsoft.com/office/drawing/2014/main" xmlns="" id="{208B8086-02CF-4961-8386-8175387516DA}"/>
               </a:ext>
             </a:extLst>
           </p:cNvPr>
@@ -275,7 +275,7 @@
           <p:cNvPr id="4" name="Footer Placeholder 3">
             <a:extLst>
               <a:ext uri="{FF2B5EF4-FFF2-40B4-BE49-F238E27FC236}">
-                <a16:creationId xmlns="" xmlns:a16="http://schemas.microsoft.com/office/drawing/2014/main" id="{A59372D3-1B5B-4FDF-ABDD-C257FF3C9D4B}"/>
+                <a16:creationId xmlns:a16="http://schemas.microsoft.com/office/drawing/2014/main" xmlns="" id="{A59372D3-1B5B-4FDF-ABDD-C257FF3C9D4B}"/>
               </a:ext>
             </a:extLst>
           </p:cNvPr>
@@ -312,7 +312,7 @@
           <p:cNvPr id="5" name="Slide Number Placeholder 4">
             <a:extLst>
               <a:ext uri="{FF2B5EF4-FFF2-40B4-BE49-F238E27FC236}">
-                <a16:creationId xmlns="" xmlns:a16="http://schemas.microsoft.com/office/drawing/2014/main" id="{EC5B5515-611E-494A-905F-A66D09DB4FB1}"/>
+                <a16:creationId xmlns:a16="http://schemas.microsoft.com/office/drawing/2014/main" xmlns="" id="{EC5B5515-611E-494A-905F-A66D09DB4FB1}"/>
               </a:ext>
             </a:extLst>
           </p:cNvPr>
@@ -983,7 +983,7 @@
           <p:cNvPr id="2" name="Title 1">
             <a:extLst>
               <a:ext uri="{FF2B5EF4-FFF2-40B4-BE49-F238E27FC236}">
-                <a16:creationId xmlns="" xmlns:a16="http://schemas.microsoft.com/office/drawing/2014/main" id="{A7D79ED3-B10A-4011-AF67-6ACD5DAB7A80}"/>
+                <a16:creationId xmlns:a16="http://schemas.microsoft.com/office/drawing/2014/main" xmlns="" id="{A7D79ED3-B10A-4011-AF67-6ACD5DAB7A80}"/>
               </a:ext>
             </a:extLst>
           </p:cNvPr>
@@ -1033,7 +1033,7 @@
           <p:cNvPr id="3" name="Content Placeholder 2">
             <a:extLst>
               <a:ext uri="{FF2B5EF4-FFF2-40B4-BE49-F238E27FC236}">
-                <a16:creationId xmlns="" xmlns:a16="http://schemas.microsoft.com/office/drawing/2014/main" id="{4DEC7CEF-61EF-4CD0-8527-A825A9BE197E}"/>
+                <a16:creationId xmlns:a16="http://schemas.microsoft.com/office/drawing/2014/main" xmlns="" id="{4DEC7CEF-61EF-4CD0-8527-A825A9BE197E}"/>
               </a:ext>
             </a:extLst>
           </p:cNvPr>
@@ -1171,7 +1171,7 @@
           <p:cNvPr id="2" name="Title 1">
             <a:extLst>
               <a:ext uri="{FF2B5EF4-FFF2-40B4-BE49-F238E27FC236}">
-                <a16:creationId xmlns="" xmlns:a16="http://schemas.microsoft.com/office/drawing/2014/main" id="{4A77E614-69A2-422B-98D8-72BE785261EE}"/>
+                <a16:creationId xmlns:a16="http://schemas.microsoft.com/office/drawing/2014/main" xmlns="" id="{4A77E614-69A2-422B-98D8-72BE785261EE}"/>
               </a:ext>
             </a:extLst>
           </p:cNvPr>
@@ -1211,7 +1211,7 @@
           <p:cNvPr id="3" name="Content Placeholder 2">
             <a:extLst>
               <a:ext uri="{FF2B5EF4-FFF2-40B4-BE49-F238E27FC236}">
-                <a16:creationId xmlns="" xmlns:a16="http://schemas.microsoft.com/office/drawing/2014/main" id="{81634CC5-394D-496A-8C37-9757651887E1}"/>
+                <a16:creationId xmlns:a16="http://schemas.microsoft.com/office/drawing/2014/main" xmlns="" id="{81634CC5-394D-496A-8C37-9757651887E1}"/>
               </a:ext>
             </a:extLst>
           </p:cNvPr>
@@ -1301,7 +1301,7 @@
           <p:cNvPr id="4" name="Text Placeholder 3">
             <a:extLst>
               <a:ext uri="{FF2B5EF4-FFF2-40B4-BE49-F238E27FC236}">
-                <a16:creationId xmlns="" xmlns:a16="http://schemas.microsoft.com/office/drawing/2014/main" id="{1354BA71-5FE3-432E-BF12-2D2784651E34}"/>
+                <a16:creationId xmlns:a16="http://schemas.microsoft.com/office/drawing/2014/main" xmlns="" id="{1354BA71-5FE3-432E-BF12-2D2784651E34}"/>
               </a:ext>
             </a:extLst>
           </p:cNvPr>
@@ -1372,7 +1372,7 @@
           <p:cNvPr id="5" name="Date Placeholder 4">
             <a:extLst>
               <a:ext uri="{FF2B5EF4-FFF2-40B4-BE49-F238E27FC236}">
-                <a16:creationId xmlns="" xmlns:a16="http://schemas.microsoft.com/office/drawing/2014/main" id="{9715FB58-E8FC-4F0D-9758-BF087AE37DEB}"/>
+                <a16:creationId xmlns:a16="http://schemas.microsoft.com/office/drawing/2014/main" xmlns="" id="{9715FB58-E8FC-4F0D-9758-BF087AE37DEB}"/>
               </a:ext>
             </a:extLst>
           </p:cNvPr>
@@ -1435,7 +1435,7 @@
           <p:cNvPr id="2" name="Title 1">
             <a:extLst>
               <a:ext uri="{FF2B5EF4-FFF2-40B4-BE49-F238E27FC236}">
-                <a16:creationId xmlns="" xmlns:a16="http://schemas.microsoft.com/office/drawing/2014/main" id="{F4B87278-1FD8-415C-AE1D-45F3021BE3F6}"/>
+                <a16:creationId xmlns:a16="http://schemas.microsoft.com/office/drawing/2014/main" xmlns="" id="{F4B87278-1FD8-415C-AE1D-45F3021BE3F6}"/>
               </a:ext>
             </a:extLst>
           </p:cNvPr>
@@ -1475,7 +1475,7 @@
           <p:cNvPr id="3" name="Picture Placeholder 2">
             <a:extLst>
               <a:ext uri="{FF2B5EF4-FFF2-40B4-BE49-F238E27FC236}">
-                <a16:creationId xmlns="" xmlns:a16="http://schemas.microsoft.com/office/drawing/2014/main" id="{3D12B3E8-7C2C-40FD-BD3D-84658280BEB2}"/>
+                <a16:creationId xmlns:a16="http://schemas.microsoft.com/office/drawing/2014/main" xmlns="" id="{3D12B3E8-7C2C-40FD-BD3D-84658280BEB2}"/>
               </a:ext>
             </a:extLst>
           </p:cNvPr>
@@ -1542,7 +1542,7 @@
           <p:cNvPr id="4" name="Text Placeholder 3">
             <a:extLst>
               <a:ext uri="{FF2B5EF4-FFF2-40B4-BE49-F238E27FC236}">
-                <a16:creationId xmlns="" xmlns:a16="http://schemas.microsoft.com/office/drawing/2014/main" id="{77A792C1-1478-447A-92F4-1D4FA477D4C0}"/>
+                <a16:creationId xmlns:a16="http://schemas.microsoft.com/office/drawing/2014/main" xmlns="" id="{77A792C1-1478-447A-92F4-1D4FA477D4C0}"/>
               </a:ext>
             </a:extLst>
           </p:cNvPr>
@@ -1613,7 +1613,7 @@
           <p:cNvPr id="5" name="Title 1">
             <a:extLst>
               <a:ext uri="{FF2B5EF4-FFF2-40B4-BE49-F238E27FC236}">
-                <a16:creationId xmlns="" xmlns:a16="http://schemas.microsoft.com/office/drawing/2014/main" id="{D172DB45-B534-49F2-9982-1C550BFE97E3}"/>
+                <a16:creationId xmlns:a16="http://schemas.microsoft.com/office/drawing/2014/main" xmlns="" id="{D172DB45-B534-49F2-9982-1C550BFE97E3}"/>
               </a:ext>
             </a:extLst>
           </p:cNvPr>
@@ -1699,7 +1699,7 @@
           <p:cNvPr id="3" name="Vertical Text Placeholder 2">
             <a:extLst>
               <a:ext uri="{FF2B5EF4-FFF2-40B4-BE49-F238E27FC236}">
-                <a16:creationId xmlns="" xmlns:a16="http://schemas.microsoft.com/office/drawing/2014/main" id="{2E49C9B2-008E-4048-9FE2-AB3E28E45F1E}"/>
+                <a16:creationId xmlns:a16="http://schemas.microsoft.com/office/drawing/2014/main" xmlns="" id="{2E49C9B2-008E-4048-9FE2-AB3E28E45F1E}"/>
               </a:ext>
             </a:extLst>
           </p:cNvPr>
@@ -1756,7 +1756,7 @@
           <p:cNvPr id="4" name="Date Placeholder 3">
             <a:extLst>
               <a:ext uri="{FF2B5EF4-FFF2-40B4-BE49-F238E27FC236}">
-                <a16:creationId xmlns="" xmlns:a16="http://schemas.microsoft.com/office/drawing/2014/main" id="{91AEC9CE-F677-4A68-B9CA-B401A4E9B39B}"/>
+                <a16:creationId xmlns:a16="http://schemas.microsoft.com/office/drawing/2014/main" xmlns="" id="{91AEC9CE-F677-4A68-B9CA-B401A4E9B39B}"/>
               </a:ext>
             </a:extLst>
           </p:cNvPr>
@@ -1789,7 +1789,7 @@
           <p:cNvPr id="5" name="Title 1">
             <a:extLst>
               <a:ext uri="{FF2B5EF4-FFF2-40B4-BE49-F238E27FC236}">
-                <a16:creationId xmlns="" xmlns:a16="http://schemas.microsoft.com/office/drawing/2014/main" id="{9DFCF35C-83F6-4F0B-9F40-A528099039C8}"/>
+                <a16:creationId xmlns:a16="http://schemas.microsoft.com/office/drawing/2014/main" xmlns="" id="{9DFCF35C-83F6-4F0B-9F40-A528099039C8}"/>
               </a:ext>
             </a:extLst>
           </p:cNvPr>
@@ -1869,7 +1869,7 @@
           <p:cNvPr id="7" name="Title 1">
             <a:extLst>
               <a:ext uri="{FF2B5EF4-FFF2-40B4-BE49-F238E27FC236}">
-                <a16:creationId xmlns="" xmlns:a16="http://schemas.microsoft.com/office/drawing/2014/main" id="{E041BA94-CFCE-4938-B330-BFF43C38CAE6}"/>
+                <a16:creationId xmlns:a16="http://schemas.microsoft.com/office/drawing/2014/main" xmlns="" id="{E041BA94-CFCE-4938-B330-BFF43C38CAE6}"/>
               </a:ext>
             </a:extLst>
           </p:cNvPr>
@@ -1949,7 +1949,7 @@
           <p:cNvPr id="2" name="Title 1">
             <a:extLst>
               <a:ext uri="{FF2B5EF4-FFF2-40B4-BE49-F238E27FC236}">
-                <a16:creationId xmlns="" xmlns:a16="http://schemas.microsoft.com/office/drawing/2014/main" id="{44163617-BFF5-46E2-B3DD-2F203030153E}"/>
+                <a16:creationId xmlns:a16="http://schemas.microsoft.com/office/drawing/2014/main" xmlns="" id="{44163617-BFF5-46E2-B3DD-2F203030153E}"/>
               </a:ext>
             </a:extLst>
           </p:cNvPr>
@@ -1989,7 +1989,7 @@
           <p:cNvPr id="3" name="Subtitle 2">
             <a:extLst>
               <a:ext uri="{FF2B5EF4-FFF2-40B4-BE49-F238E27FC236}">
-                <a16:creationId xmlns="" xmlns:a16="http://schemas.microsoft.com/office/drawing/2014/main" id="{4D0D1006-0AAF-43C0-932D-A7EA8AF049B0}"/>
+                <a16:creationId xmlns:a16="http://schemas.microsoft.com/office/drawing/2014/main" xmlns="" id="{4D0D1006-0AAF-43C0-932D-A7EA8AF049B0}"/>
               </a:ext>
             </a:extLst>
           </p:cNvPr>
@@ -2095,7 +2095,7 @@
           <p:cNvPr id="2" name="Title 1">
             <a:extLst>
               <a:ext uri="{FF2B5EF4-FFF2-40B4-BE49-F238E27FC236}">
-                <a16:creationId xmlns="" xmlns:a16="http://schemas.microsoft.com/office/drawing/2014/main" id="{A7D79ED3-B10A-4011-AF67-6ACD5DAB7A80}"/>
+                <a16:creationId xmlns:a16="http://schemas.microsoft.com/office/drawing/2014/main" xmlns="" id="{A7D79ED3-B10A-4011-AF67-6ACD5DAB7A80}"/>
               </a:ext>
             </a:extLst>
           </p:cNvPr>
@@ -2145,7 +2145,7 @@
           <p:cNvPr id="6" name="Picture Placeholder 5">
             <a:extLst>
               <a:ext uri="{FF2B5EF4-FFF2-40B4-BE49-F238E27FC236}">
-                <a16:creationId xmlns="" xmlns:a16="http://schemas.microsoft.com/office/drawing/2014/main" id="{A78DDC46-9B3D-46C2-ADCE-19B2C6DC5A00}"/>
+                <a16:creationId xmlns:a16="http://schemas.microsoft.com/office/drawing/2014/main" xmlns="" id="{A78DDC46-9B3D-46C2-ADCE-19B2C6DC5A00}"/>
               </a:ext>
             </a:extLst>
           </p:cNvPr>
@@ -2175,7 +2175,7 @@
           <p:cNvPr id="20" name="Picture Placeholder 5">
             <a:extLst>
               <a:ext uri="{FF2B5EF4-FFF2-40B4-BE49-F238E27FC236}">
-                <a16:creationId xmlns="" xmlns:a16="http://schemas.microsoft.com/office/drawing/2014/main" id="{1BF323E5-6151-4669-ABC7-7C78D88ABD5A}"/>
+                <a16:creationId xmlns:a16="http://schemas.microsoft.com/office/drawing/2014/main" xmlns="" id="{1BF323E5-6151-4669-ABC7-7C78D88ABD5A}"/>
               </a:ext>
             </a:extLst>
           </p:cNvPr>
@@ -2205,7 +2205,7 @@
           <p:cNvPr id="21" name="Picture Placeholder 5">
             <a:extLst>
               <a:ext uri="{FF2B5EF4-FFF2-40B4-BE49-F238E27FC236}">
-                <a16:creationId xmlns="" xmlns:a16="http://schemas.microsoft.com/office/drawing/2014/main" id="{E3D2213A-128A-4330-A0BB-AFA2CB01F0EA}"/>
+                <a16:creationId xmlns:a16="http://schemas.microsoft.com/office/drawing/2014/main" xmlns="" id="{E3D2213A-128A-4330-A0BB-AFA2CB01F0EA}"/>
               </a:ext>
             </a:extLst>
           </p:cNvPr>
@@ -2235,7 +2235,7 @@
           <p:cNvPr id="22" name="Picture Placeholder 5">
             <a:extLst>
               <a:ext uri="{FF2B5EF4-FFF2-40B4-BE49-F238E27FC236}">
-                <a16:creationId xmlns="" xmlns:a16="http://schemas.microsoft.com/office/drawing/2014/main" id="{C1D6DFBD-21FE-44CA-8F1E-11FCBB643BD1}"/>
+                <a16:creationId xmlns:a16="http://schemas.microsoft.com/office/drawing/2014/main" xmlns="" id="{C1D6DFBD-21FE-44CA-8F1E-11FCBB643BD1}"/>
               </a:ext>
             </a:extLst>
           </p:cNvPr>
@@ -2265,7 +2265,7 @@
           <p:cNvPr id="23" name="Picture Placeholder 5">
             <a:extLst>
               <a:ext uri="{FF2B5EF4-FFF2-40B4-BE49-F238E27FC236}">
-                <a16:creationId xmlns="" xmlns:a16="http://schemas.microsoft.com/office/drawing/2014/main" id="{A1762A90-19B1-48E7-B8E9-6AB92F3F4152}"/>
+                <a16:creationId xmlns:a16="http://schemas.microsoft.com/office/drawing/2014/main" xmlns="" id="{A1762A90-19B1-48E7-B8E9-6AB92F3F4152}"/>
               </a:ext>
             </a:extLst>
           </p:cNvPr>
@@ -2335,7 +2335,7 @@
           <p:cNvPr id="13" name="Picture Placeholder 12">
             <a:extLst>
               <a:ext uri="{FF2B5EF4-FFF2-40B4-BE49-F238E27FC236}">
-                <a16:creationId xmlns="" xmlns:a16="http://schemas.microsoft.com/office/drawing/2014/main" id="{A4984479-1823-4BDB-AAA8-6F7D67888FD9}"/>
+                <a16:creationId xmlns:a16="http://schemas.microsoft.com/office/drawing/2014/main" xmlns="" id="{A4984479-1823-4BDB-AAA8-6F7D67888FD9}"/>
               </a:ext>
             </a:extLst>
           </p:cNvPr>
@@ -2449,7 +2449,7 @@
           <p:cNvPr id="9" name="TextBox 8">
             <a:extLst>
               <a:ext uri="{FF2B5EF4-FFF2-40B4-BE49-F238E27FC236}">
-                <a16:creationId xmlns="" xmlns:a16="http://schemas.microsoft.com/office/drawing/2014/main" id="{A151C6D3-C641-4214-965C-FC6D77B454E3}"/>
+                <a16:creationId xmlns:a16="http://schemas.microsoft.com/office/drawing/2014/main" xmlns="" id="{A151C6D3-C641-4214-965C-FC6D77B454E3}"/>
               </a:ext>
             </a:extLst>
           </p:cNvPr>
@@ -2491,7 +2491,7 @@
           <p:cNvPr id="2" name="TextBox 1">
             <a:extLst>
               <a:ext uri="{FF2B5EF4-FFF2-40B4-BE49-F238E27FC236}">
-                <a16:creationId xmlns="" xmlns:a16="http://schemas.microsoft.com/office/drawing/2014/main" id="{829D153A-85D4-4F26-A281-65D45DABC568}"/>
+                <a16:creationId xmlns:a16="http://schemas.microsoft.com/office/drawing/2014/main" xmlns="" id="{829D153A-85D4-4F26-A281-65D45DABC568}"/>
               </a:ext>
             </a:extLst>
           </p:cNvPr>
@@ -2532,7 +2532,7 @@
           <p:cNvPr id="3" name="Isosceles Triangle 2">
             <a:extLst>
               <a:ext uri="{FF2B5EF4-FFF2-40B4-BE49-F238E27FC236}">
-                <a16:creationId xmlns="" xmlns:a16="http://schemas.microsoft.com/office/drawing/2014/main" id="{26954000-20E3-482A-B4B0-5D22939CF736}"/>
+                <a16:creationId xmlns:a16="http://schemas.microsoft.com/office/drawing/2014/main" xmlns="" id="{26954000-20E3-482A-B4B0-5D22939CF736}"/>
               </a:ext>
             </a:extLst>
           </p:cNvPr>
@@ -2590,7 +2590,7 @@
           <p:cNvPr id="4" name="TextBox 3">
             <a:extLst>
               <a:ext uri="{FF2B5EF4-FFF2-40B4-BE49-F238E27FC236}">
-                <a16:creationId xmlns="" xmlns:a16="http://schemas.microsoft.com/office/drawing/2014/main" id="{A24CE37A-ECF5-410C-B6BD-6E2EDFADC040}"/>
+                <a16:creationId xmlns:a16="http://schemas.microsoft.com/office/drawing/2014/main" xmlns="" id="{A24CE37A-ECF5-410C-B6BD-6E2EDFADC040}"/>
               </a:ext>
             </a:extLst>
           </p:cNvPr>
@@ -2631,7 +2631,7 @@
           <p:cNvPr id="18" name="Picture Placeholder 5" descr="A picture containing person, indoor, clothing, man&#10;&#10;Description automatically generated">
             <a:extLst>
               <a:ext uri="{FF2B5EF4-FFF2-40B4-BE49-F238E27FC236}">
-                <a16:creationId xmlns="" xmlns:a16="http://schemas.microsoft.com/office/drawing/2014/main" id="{ED3484C4-B905-40F1-B8FD-A42F11B5F7A2}"/>
+                <a16:creationId xmlns:a16="http://schemas.microsoft.com/office/drawing/2014/main" xmlns="" id="{ED3484C4-B905-40F1-B8FD-A42F11B5F7A2}"/>
               </a:ext>
             </a:extLst>
           </p:cNvPr>
@@ -2668,7 +2668,7 @@
           <p:cNvPr id="19" name="Picture Placeholder 4" descr="A picture containing light&#10;&#10;Description automatically generated">
             <a:extLst>
               <a:ext uri="{FF2B5EF4-FFF2-40B4-BE49-F238E27FC236}">
-                <a16:creationId xmlns="" xmlns:a16="http://schemas.microsoft.com/office/drawing/2014/main" id="{0618D849-162F-46EC-8EFA-B9384C8FABF5}"/>
+                <a16:creationId xmlns:a16="http://schemas.microsoft.com/office/drawing/2014/main" xmlns="" id="{0618D849-162F-46EC-8EFA-B9384C8FABF5}"/>
               </a:ext>
             </a:extLst>
           </p:cNvPr>
@@ -2757,7 +2757,7 @@
           <p:cNvPr id="13" name="Picture Placeholder 12">
             <a:extLst>
               <a:ext uri="{FF2B5EF4-FFF2-40B4-BE49-F238E27FC236}">
-                <a16:creationId xmlns="" xmlns:a16="http://schemas.microsoft.com/office/drawing/2014/main" id="{A4984479-1823-4BDB-AAA8-6F7D67888FD9}"/>
+                <a16:creationId xmlns:a16="http://schemas.microsoft.com/office/drawing/2014/main" xmlns="" id="{A4984479-1823-4BDB-AAA8-6F7D67888FD9}"/>
               </a:ext>
             </a:extLst>
           </p:cNvPr>
@@ -2871,7 +2871,7 @@
           <p:cNvPr id="14" name="Picture Placeholder 12">
             <a:extLst>
               <a:ext uri="{FF2B5EF4-FFF2-40B4-BE49-F238E27FC236}">
-                <a16:creationId xmlns="" xmlns:a16="http://schemas.microsoft.com/office/drawing/2014/main" id="{8BD2EEFA-8252-4979-8B48-D13EEB8A4E19}"/>
+                <a16:creationId xmlns:a16="http://schemas.microsoft.com/office/drawing/2014/main" xmlns="" id="{8BD2EEFA-8252-4979-8B48-D13EEB8A4E19}"/>
               </a:ext>
             </a:extLst>
           </p:cNvPr>
@@ -2981,7 +2981,7 @@
           <p:cNvPr id="15" name="Picture Placeholder 12">
             <a:extLst>
               <a:ext uri="{FF2B5EF4-FFF2-40B4-BE49-F238E27FC236}">
-                <a16:creationId xmlns="" xmlns:a16="http://schemas.microsoft.com/office/drawing/2014/main" id="{4A49F27C-7E3B-4D20-B431-E1FC318DDF6C}"/>
+                <a16:creationId xmlns:a16="http://schemas.microsoft.com/office/drawing/2014/main" xmlns="" id="{4A49F27C-7E3B-4D20-B431-E1FC318DDF6C}"/>
               </a:ext>
             </a:extLst>
           </p:cNvPr>
@@ -3027,7 +3027,7 @@
           <p:cNvPr id="10" name="Round Diagonal Corner Rectangle 4">
             <a:extLst>
               <a:ext uri="{FF2B5EF4-FFF2-40B4-BE49-F238E27FC236}">
-                <a16:creationId xmlns="" xmlns:a16="http://schemas.microsoft.com/office/drawing/2014/main" id="{16DC8360-D4F7-405A-BF06-04DDCFD5DEFE}"/>
+                <a16:creationId xmlns:a16="http://schemas.microsoft.com/office/drawing/2014/main" xmlns="" id="{16DC8360-D4F7-405A-BF06-04DDCFD5DEFE}"/>
               </a:ext>
             </a:extLst>
           </p:cNvPr>
@@ -3753,7 +3753,7 @@
           <p:cNvPr id="4" name="Text Placeholder 3">
             <a:extLst>
               <a:ext uri="{FF2B5EF4-FFF2-40B4-BE49-F238E27FC236}">
-                <a16:creationId xmlns="" xmlns:a16="http://schemas.microsoft.com/office/drawing/2014/main" id="{2F34D05A-E35A-4B83-BE73-13C53A3B9E1B}"/>
+                <a16:creationId xmlns:a16="http://schemas.microsoft.com/office/drawing/2014/main" xmlns="" id="{2F34D05A-E35A-4B83-BE73-13C53A3B9E1B}"/>
               </a:ext>
             </a:extLst>
           </p:cNvPr>
@@ -3875,7 +3875,7 @@
           <p:cNvPr id="6" name="Text Placeholder 6">
             <a:extLst>
               <a:ext uri="{FF2B5EF4-FFF2-40B4-BE49-F238E27FC236}">
-                <a16:creationId xmlns="" xmlns:a16="http://schemas.microsoft.com/office/drawing/2014/main" id="{12C8DA23-E484-4D16-8C50-77D951B51DD4}"/>
+                <a16:creationId xmlns:a16="http://schemas.microsoft.com/office/drawing/2014/main" xmlns="" id="{12C8DA23-E484-4D16-8C50-77D951B51DD4}"/>
               </a:ext>
             </a:extLst>
           </p:cNvPr>
@@ -3945,7 +3945,7 @@
           <p:cNvPr id="8" name="Picture Placeholder 8">
             <a:extLst>
               <a:ext uri="{FF2B5EF4-FFF2-40B4-BE49-F238E27FC236}">
-                <a16:creationId xmlns="" xmlns:a16="http://schemas.microsoft.com/office/drawing/2014/main" id="{972A00B0-5109-4795-B6DD-671C71DA1449}"/>
+                <a16:creationId xmlns:a16="http://schemas.microsoft.com/office/drawing/2014/main" xmlns="" id="{972A00B0-5109-4795-B6DD-671C71DA1449}"/>
               </a:ext>
             </a:extLst>
           </p:cNvPr>
@@ -4277,7 +4277,7 @@
           <p:cNvPr id="5" name="Slide Number Placeholder 6">
             <a:extLst>
               <a:ext uri="{FF2B5EF4-FFF2-40B4-BE49-F238E27FC236}">
-                <a16:creationId xmlns="" xmlns:a16="http://schemas.microsoft.com/office/drawing/2014/main" id="{42A00E48-5D27-4A3C-8BB2-A39822868FBC}"/>
+                <a16:creationId xmlns:a16="http://schemas.microsoft.com/office/drawing/2014/main" xmlns="" id="{42A00E48-5D27-4A3C-8BB2-A39822868FBC}"/>
               </a:ext>
             </a:extLst>
           </p:cNvPr>
@@ -4447,7 +4447,7 @@
           <p:cNvPr id="7" name="Round Diagonal Corner Rectangle 4">
             <a:extLst>
               <a:ext uri="{FF2B5EF4-FFF2-40B4-BE49-F238E27FC236}">
-                <a16:creationId xmlns="" xmlns:a16="http://schemas.microsoft.com/office/drawing/2014/main" id="{231B8D91-3113-4251-BBA5-C25AE54B04E5}"/>
+                <a16:creationId xmlns:a16="http://schemas.microsoft.com/office/drawing/2014/main" xmlns="" id="{231B8D91-3113-4251-BBA5-C25AE54B04E5}"/>
               </a:ext>
             </a:extLst>
           </p:cNvPr>
@@ -5173,7 +5173,7 @@
           <p:cNvPr id="5" name="TextBox 4">
             <a:extLst>
               <a:ext uri="{FF2B5EF4-FFF2-40B4-BE49-F238E27FC236}">
-                <a16:creationId xmlns="" xmlns:a16="http://schemas.microsoft.com/office/drawing/2014/main" id="{5948C52D-FE52-4612-94F8-A19BC2416499}"/>
+                <a16:creationId xmlns:a16="http://schemas.microsoft.com/office/drawing/2014/main" xmlns="" id="{5948C52D-FE52-4612-94F8-A19BC2416499}"/>
               </a:ext>
             </a:extLst>
           </p:cNvPr>
@@ -5225,7 +5225,7 @@
           <p:cNvPr id="11" name="Picture Placeholder 8">
             <a:extLst>
               <a:ext uri="{FF2B5EF4-FFF2-40B4-BE49-F238E27FC236}">
-                <a16:creationId xmlns="" xmlns:a16="http://schemas.microsoft.com/office/drawing/2014/main" id="{44D1CAC3-6326-4129-99D2-FB679770CAF7}"/>
+                <a16:creationId xmlns:a16="http://schemas.microsoft.com/office/drawing/2014/main" xmlns="" id="{44D1CAC3-6326-4129-99D2-FB679770CAF7}"/>
               </a:ext>
             </a:extLst>
           </p:cNvPr>
@@ -5557,7 +5557,7 @@
           <p:cNvPr id="12" name="TextBox 11">
             <a:extLst>
               <a:ext uri="{FF2B5EF4-FFF2-40B4-BE49-F238E27FC236}">
-                <a16:creationId xmlns="" xmlns:a16="http://schemas.microsoft.com/office/drawing/2014/main" id="{723C988B-E45C-407C-9435-386DE577E007}"/>
+                <a16:creationId xmlns:a16="http://schemas.microsoft.com/office/drawing/2014/main" xmlns="" id="{723C988B-E45C-407C-9435-386DE577E007}"/>
               </a:ext>
             </a:extLst>
           </p:cNvPr>
@@ -5629,7 +5629,7 @@
           <p:cNvPr id="3" name="Content Placeholder 2">
             <a:extLst>
               <a:ext uri="{FF2B5EF4-FFF2-40B4-BE49-F238E27FC236}">
-                <a16:creationId xmlns="" xmlns:a16="http://schemas.microsoft.com/office/drawing/2014/main" id="{7A84D35A-504E-4CC7-8849-573C729FA28C}"/>
+                <a16:creationId xmlns:a16="http://schemas.microsoft.com/office/drawing/2014/main" xmlns="" id="{7A84D35A-504E-4CC7-8849-573C729FA28C}"/>
               </a:ext>
             </a:extLst>
           </p:cNvPr>
@@ -5691,7 +5691,7 @@
           <p:cNvPr id="4" name="Content Placeholder 3">
             <a:extLst>
               <a:ext uri="{FF2B5EF4-FFF2-40B4-BE49-F238E27FC236}">
-                <a16:creationId xmlns="" xmlns:a16="http://schemas.microsoft.com/office/drawing/2014/main" id="{2B33CE2D-B3E7-4DFE-9B90-04D78FB0304F}"/>
+                <a16:creationId xmlns:a16="http://schemas.microsoft.com/office/drawing/2014/main" xmlns="" id="{2B33CE2D-B3E7-4DFE-9B90-04D78FB0304F}"/>
               </a:ext>
             </a:extLst>
           </p:cNvPr>
@@ -5753,7 +5753,7 @@
           <p:cNvPr id="5" name="Date Placeholder 4">
             <a:extLst>
               <a:ext uri="{FF2B5EF4-FFF2-40B4-BE49-F238E27FC236}">
-                <a16:creationId xmlns="" xmlns:a16="http://schemas.microsoft.com/office/drawing/2014/main" id="{FF8E5273-B025-4656-866F-9334D7C5F2DA}"/>
+                <a16:creationId xmlns:a16="http://schemas.microsoft.com/office/drawing/2014/main" xmlns="" id="{FF8E5273-B025-4656-866F-9334D7C5F2DA}"/>
               </a:ext>
             </a:extLst>
           </p:cNvPr>
@@ -5786,7 +5786,7 @@
           <p:cNvPr id="6" name="Title 1">
             <a:extLst>
               <a:ext uri="{FF2B5EF4-FFF2-40B4-BE49-F238E27FC236}">
-                <a16:creationId xmlns="" xmlns:a16="http://schemas.microsoft.com/office/drawing/2014/main" id="{9C5B282F-BEB5-4105-BD80-2545D902FA79}"/>
+                <a16:creationId xmlns:a16="http://schemas.microsoft.com/office/drawing/2014/main" xmlns="" id="{9C5B282F-BEB5-4105-BD80-2545D902FA79}"/>
               </a:ext>
             </a:extLst>
           </p:cNvPr>
@@ -5871,7 +5871,7 @@
           <p:cNvPr id="2" name="Title Placeholder 1">
             <a:extLst>
               <a:ext uri="{FF2B5EF4-FFF2-40B4-BE49-F238E27FC236}">
-                <a16:creationId xmlns="" xmlns:a16="http://schemas.microsoft.com/office/drawing/2014/main" id="{5496B37D-6341-4AF1-99EF-CF2AF93B732A}"/>
+                <a16:creationId xmlns:a16="http://schemas.microsoft.com/office/drawing/2014/main" xmlns="" id="{5496B37D-6341-4AF1-99EF-CF2AF93B732A}"/>
               </a:ext>
             </a:extLst>
           </p:cNvPr>
@@ -5909,7 +5909,7 @@
           <p:cNvPr id="3" name="Text Placeholder 2">
             <a:extLst>
               <a:ext uri="{FF2B5EF4-FFF2-40B4-BE49-F238E27FC236}">
-                <a16:creationId xmlns="" xmlns:a16="http://schemas.microsoft.com/office/drawing/2014/main" id="{D876C1EE-3917-4881-A597-C4D76B308C84}"/>
+                <a16:creationId xmlns:a16="http://schemas.microsoft.com/office/drawing/2014/main" xmlns="" id="{D876C1EE-3917-4881-A597-C4D76B308C84}"/>
               </a:ext>
             </a:extLst>
           </p:cNvPr>
@@ -5976,7 +5976,7 @@
           <p:cNvPr id="4" name="Date Placeholder 3">
             <a:extLst>
               <a:ext uri="{FF2B5EF4-FFF2-40B4-BE49-F238E27FC236}">
-                <a16:creationId xmlns="" xmlns:a16="http://schemas.microsoft.com/office/drawing/2014/main" id="{3185B6CA-F987-4CBC-9B90-6906EB9E7032}"/>
+                <a16:creationId xmlns:a16="http://schemas.microsoft.com/office/drawing/2014/main" xmlns="" id="{3185B6CA-F987-4CBC-9B90-6906EB9E7032}"/>
               </a:ext>
             </a:extLst>
           </p:cNvPr>
@@ -6019,7 +6019,7 @@
           <p:cNvPr id="5" name="Footer Placeholder 4">
             <a:extLst>
               <a:ext uri="{FF2B5EF4-FFF2-40B4-BE49-F238E27FC236}">
-                <a16:creationId xmlns="" xmlns:a16="http://schemas.microsoft.com/office/drawing/2014/main" id="{656D7D55-4440-4B3D-A8C9-C5AD8855CDC5}"/>
+                <a16:creationId xmlns:a16="http://schemas.microsoft.com/office/drawing/2014/main" xmlns="" id="{656D7D55-4440-4B3D-A8C9-C5AD8855CDC5}"/>
               </a:ext>
             </a:extLst>
           </p:cNvPr>
@@ -6065,7 +6065,7 @@
           <p:cNvPr id="6" name="Slide Number Placeholder 5">
             <a:extLst>
               <a:ext uri="{FF2B5EF4-FFF2-40B4-BE49-F238E27FC236}">
-                <a16:creationId xmlns="" xmlns:a16="http://schemas.microsoft.com/office/drawing/2014/main" id="{32B77707-0A0A-4C39-A940-FF668BF4837C}"/>
+                <a16:creationId xmlns:a16="http://schemas.microsoft.com/office/drawing/2014/main" xmlns="" id="{32B77707-0A0A-4C39-A940-FF668BF4837C}"/>
               </a:ext>
             </a:extLst>
           </p:cNvPr>
@@ -6112,7 +6112,7 @@
           <p:cNvPr id="10" name="Rectangle 9">
             <a:extLst>
               <a:ext uri="{FF2B5EF4-FFF2-40B4-BE49-F238E27FC236}">
-                <a16:creationId xmlns="" xmlns:a16="http://schemas.microsoft.com/office/drawing/2014/main" id="{AFEC8C3E-FC73-4206-AA27-5B4ABCF7E55A}"/>
+                <a16:creationId xmlns:a16="http://schemas.microsoft.com/office/drawing/2014/main" xmlns="" id="{AFEC8C3E-FC73-4206-AA27-5B4ABCF7E55A}"/>
               </a:ext>
             </a:extLst>
           </p:cNvPr>
@@ -6166,7 +6166,7 @@
           <p:cNvPr id="11" name="TextBox 10">
             <a:extLst>
               <a:ext uri="{FF2B5EF4-FFF2-40B4-BE49-F238E27FC236}">
-                <a16:creationId xmlns="" xmlns:a16="http://schemas.microsoft.com/office/drawing/2014/main" id="{CA91D5D0-EADB-46FF-BEDE-324908AF194B}"/>
+                <a16:creationId xmlns:a16="http://schemas.microsoft.com/office/drawing/2014/main" xmlns="" id="{CA91D5D0-EADB-46FF-BEDE-324908AF194B}"/>
               </a:ext>
             </a:extLst>
           </p:cNvPr>
@@ -6206,7 +6206,7 @@
           <p:cNvPr id="12" name="Slide Number Placeholder 6">
             <a:extLst>
               <a:ext uri="{FF2B5EF4-FFF2-40B4-BE49-F238E27FC236}">
-                <a16:creationId xmlns="" xmlns:a16="http://schemas.microsoft.com/office/drawing/2014/main" id="{D8353F3A-2EA5-4407-B714-59A227870F73}"/>
+                <a16:creationId xmlns:a16="http://schemas.microsoft.com/office/drawing/2014/main" xmlns="" id="{D8353F3A-2EA5-4407-B714-59A227870F73}"/>
               </a:ext>
             </a:extLst>
           </p:cNvPr>
@@ -6336,7 +6336,7 @@
           <p:cNvPr id="13" name="Footer Placeholder 4">
             <a:extLst>
               <a:ext uri="{FF2B5EF4-FFF2-40B4-BE49-F238E27FC236}">
-                <a16:creationId xmlns="" xmlns:a16="http://schemas.microsoft.com/office/drawing/2014/main" id="{C9026A98-605F-4786-A699-BB93F86A8A1B}"/>
+                <a16:creationId xmlns:a16="http://schemas.microsoft.com/office/drawing/2014/main" xmlns="" id="{C9026A98-605F-4786-A699-BB93F86A8A1B}"/>
               </a:ext>
             </a:extLst>
           </p:cNvPr>
@@ -6799,7 +6799,7 @@
           <p:cNvPr id="38" name="Text Placeholder 24">
             <a:extLst>
               <a:ext uri="{FF2B5EF4-FFF2-40B4-BE49-F238E27FC236}">
-                <a16:creationId xmlns="" xmlns:a16="http://schemas.microsoft.com/office/drawing/2014/main" id="{682BA027-05D3-420C-A6D2-F251355E5A2C}"/>
+                <a16:creationId xmlns:a16="http://schemas.microsoft.com/office/drawing/2014/main" xmlns="" id="{682BA027-05D3-420C-A6D2-F251355E5A2C}"/>
               </a:ext>
             </a:extLst>
           </p:cNvPr>
@@ -7045,7 +7045,7 @@
           <p:cNvPr id="11" name="Picture Placeholder 10" descr="A group of people sitting at a table using a computer&#10;&#10;Description automatically generated">
             <a:extLst>
               <a:ext uri="{FF2B5EF4-FFF2-40B4-BE49-F238E27FC236}">
-                <a16:creationId xmlns="" xmlns:a16="http://schemas.microsoft.com/office/drawing/2014/main" id="{B452FDAD-54F3-4A38-B075-72E5CA4D0E1B}"/>
+                <a16:creationId xmlns:a16="http://schemas.microsoft.com/office/drawing/2014/main" xmlns="" id="{B452FDAD-54F3-4A38-B075-72E5CA4D0E1B}"/>
               </a:ext>
             </a:extLst>
           </p:cNvPr>
@@ -7166,7 +7166,7 @@
           <p:cNvPr id="3" name="Text Placeholder 2">
             <a:extLst>
               <a:ext uri="{FF2B5EF4-FFF2-40B4-BE49-F238E27FC236}">
-                <a16:creationId xmlns="" xmlns:a16="http://schemas.microsoft.com/office/drawing/2014/main" id="{F54D4468-6ABB-459C-8B44-641B9D72E0EA}"/>
+                <a16:creationId xmlns:a16="http://schemas.microsoft.com/office/drawing/2014/main" xmlns="" id="{F54D4468-6ABB-459C-8B44-641B9D72E0EA}"/>
               </a:ext>
             </a:extLst>
           </p:cNvPr>
@@ -7310,7 +7310,7 @@
           <p:cNvPr id="3" name="Text Placeholder 2">
             <a:extLst>
               <a:ext uri="{FF2B5EF4-FFF2-40B4-BE49-F238E27FC236}">
-                <a16:creationId xmlns="" xmlns:a16="http://schemas.microsoft.com/office/drawing/2014/main" id="{F54D4468-6ABB-459C-8B44-641B9D72E0EA}"/>
+                <a16:creationId xmlns:a16="http://schemas.microsoft.com/office/drawing/2014/main" xmlns="" id="{F54D4468-6ABB-459C-8B44-641B9D72E0EA}"/>
               </a:ext>
             </a:extLst>
           </p:cNvPr>
@@ -7409,7 +7409,7 @@
           <p:cNvPr id="3" name="Title 2">
             <a:extLst>
               <a:ext uri="{FF2B5EF4-FFF2-40B4-BE49-F238E27FC236}">
-                <a16:creationId xmlns="" xmlns:a16="http://schemas.microsoft.com/office/drawing/2014/main" id="{775DD48D-7C3D-4DB2-8AF5-21A51359F571}"/>
+                <a16:creationId xmlns:a16="http://schemas.microsoft.com/office/drawing/2014/main" xmlns="" id="{775DD48D-7C3D-4DB2-8AF5-21A51359F571}"/>
               </a:ext>
             </a:extLst>
           </p:cNvPr>
@@ -7451,12 +7451,12 @@
           <a:graphicData uri="http://schemas.openxmlformats.org/presentationml/2006/ole">
             <mc:AlternateContent xmlns:mc="http://schemas.openxmlformats.org/markup-compatibility/2006">
               <mc:Choice xmlns:v="urn:schemas-microsoft-com:vml" Requires="v">
-                <p:oleObj spid="_x0000_s1054" name="Document" r:id="rId4" imgW="5956042" imgH="4800499" progId="Word.Document.12">
+                <p:oleObj spid="_x0000_s1056" name="Document" r:id="rId5" imgW="5956042" imgH="4800499" progId="Word.Document.12">
                   <p:embed/>
                 </p:oleObj>
               </mc:Choice>
               <mc:Fallback>
-                <p:oleObj name="Document" r:id="rId4" imgW="5956042" imgH="4800499" progId="Word.Document.12">
+                <p:oleObj name="Document" r:id="rId5" imgW="5956042" imgH="4800499" progId="Word.Document.12">
                   <p:embed/>
                   <p:pic>
                     <p:nvPicPr>
@@ -7465,7 +7465,7 @@
                       <p:nvPr/>
                     </p:nvPicPr>
                     <p:blipFill>
-                      <a:blip r:embed="rId5"/>
+                      <a:blip r:embed="rId6"/>
                       <a:stretch>
                         <a:fillRect/>
                       </a:stretch>
@@ -7502,12 +7502,12 @@
           <a:graphicData uri="http://schemas.openxmlformats.org/presentationml/2006/ole">
             <mc:AlternateContent xmlns:mc="http://schemas.openxmlformats.org/markup-compatibility/2006">
               <mc:Choice xmlns:v="urn:schemas-microsoft-com:vml" Requires="v">
-                <p:oleObj spid="_x0000_s1055" name="Worksheet" r:id="rId6" imgW="12030019" imgH="9820182" progId="Excel.Sheet.12">
+                <p:oleObj spid="_x0000_s1057" name="Worksheet" r:id="rId8" imgW="12030019" imgH="9820182" progId="Excel.Sheet.12">
                   <p:embed/>
                 </p:oleObj>
               </mc:Choice>
               <mc:Fallback>
-                <p:oleObj name="Worksheet" r:id="rId6" imgW="12030019" imgH="9820182" progId="Excel.Sheet.12">
+                <p:oleObj name="Worksheet" r:id="rId8" imgW="12030019" imgH="9820182" progId="Excel.Sheet.12">
                   <p:embed/>
                   <p:pic>
                     <p:nvPicPr>
@@ -7516,7 +7516,7 @@
                       <p:nvPr/>
                     </p:nvPicPr>
                     <p:blipFill>
-                      <a:blip r:embed="rId7"/>
+                      <a:blip r:embed="rId9"/>
                       <a:stretch>
                         <a:fillRect/>
                       </a:stretch>
@@ -7572,7 +7572,7 @@
           <p:cNvPr id="4" name="Slide Number Placeholder 3">
             <a:extLst>
               <a:ext uri="{FF2B5EF4-FFF2-40B4-BE49-F238E27FC236}">
-                <a16:creationId xmlns="" xmlns:a16="http://schemas.microsoft.com/office/drawing/2014/main" id="{BC4CF349-B5F7-4678-9783-D95AB51DC5DA}"/>
+                <a16:creationId xmlns:a16="http://schemas.microsoft.com/office/drawing/2014/main" xmlns="" id="{BC4CF349-B5F7-4678-9783-D95AB51DC5DA}"/>
               </a:ext>
             </a:extLst>
           </p:cNvPr>
@@ -7607,7 +7607,7 @@
           <p:cNvPr id="10" name="Text Placeholder 9">
             <a:extLst>
               <a:ext uri="{FF2B5EF4-FFF2-40B4-BE49-F238E27FC236}">
-                <a16:creationId xmlns="" xmlns:a16="http://schemas.microsoft.com/office/drawing/2014/main" id="{703A757E-7E57-4B1F-BE4D-D2156C036E0A}"/>
+                <a16:creationId xmlns:a16="http://schemas.microsoft.com/office/drawing/2014/main" xmlns="" id="{703A757E-7E57-4B1F-BE4D-D2156C036E0A}"/>
               </a:ext>
             </a:extLst>
           </p:cNvPr>
@@ -7638,7 +7638,7 @@
           <p:cNvPr id="11" name="Picture Placeholder 10" descr="A close up of a keyboard&#10;&#10;Description automatically generated">
             <a:extLst>
               <a:ext uri="{FF2B5EF4-FFF2-40B4-BE49-F238E27FC236}">
-                <a16:creationId xmlns="" xmlns:a16="http://schemas.microsoft.com/office/drawing/2014/main" id="{164AC6E9-6BBA-4EDE-9641-F7C9E62E42F2}"/>
+                <a16:creationId xmlns:a16="http://schemas.microsoft.com/office/drawing/2014/main" xmlns="" id="{164AC6E9-6BBA-4EDE-9641-F7C9E62E42F2}"/>
               </a:ext>
             </a:extLst>
           </p:cNvPr>
@@ -7699,7 +7699,7 @@
           <p:cNvPr id="7" name="Picture Placeholder 6" descr="A person sitting at a table using a computer&#10;&#10;Description automatically generated">
             <a:extLst>
               <a:ext uri="{FF2B5EF4-FFF2-40B4-BE49-F238E27FC236}">
-                <a16:creationId xmlns="" xmlns:a16="http://schemas.microsoft.com/office/drawing/2014/main" id="{563B3ED5-2F53-44CE-ADDF-ACD36776967A}"/>
+                <a16:creationId xmlns:a16="http://schemas.microsoft.com/office/drawing/2014/main" xmlns="" id="{563B3ED5-2F53-44CE-ADDF-ACD36776967A}"/>
               </a:ext>
             </a:extLst>
           </p:cNvPr>
@@ -7735,7 +7735,7 @@
           <p:cNvPr id="10" name="Picture 9" descr="A picture containing light&#10;&#10;Description automatically generated">
             <a:extLst>
               <a:ext uri="{FF2B5EF4-FFF2-40B4-BE49-F238E27FC236}">
-                <a16:creationId xmlns="" xmlns:a16="http://schemas.microsoft.com/office/drawing/2014/main" id="{04E8B2B4-2506-4511-BCAC-B6AB69E4DE83}"/>
+                <a16:creationId xmlns:a16="http://schemas.microsoft.com/office/drawing/2014/main" xmlns="" id="{04E8B2B4-2506-4511-BCAC-B6AB69E4DE83}"/>
               </a:ext>
             </a:extLst>
           </p:cNvPr>
@@ -7771,7 +7771,7 @@
           <p:cNvPr id="4" name="TextBox 3">
             <a:extLst>
               <a:ext uri="{FF2B5EF4-FFF2-40B4-BE49-F238E27FC236}">
-                <a16:creationId xmlns="" xmlns:a16="http://schemas.microsoft.com/office/drawing/2014/main" id="{27F603C7-974B-4EB3-816D-D762C159B778}"/>
+                <a16:creationId xmlns:a16="http://schemas.microsoft.com/office/drawing/2014/main" xmlns="" id="{27F603C7-974B-4EB3-816D-D762C159B778}"/>
               </a:ext>
             </a:extLst>
           </p:cNvPr>
@@ -7849,7 +7849,7 @@
           <p:cNvPr id="9" name="Group 65">
             <a:extLst>
               <a:ext uri="{FF2B5EF4-FFF2-40B4-BE49-F238E27FC236}">
-                <a16:creationId xmlns="" xmlns:a16="http://schemas.microsoft.com/office/drawing/2014/main" id="{3887E36E-D8A6-4282-96A2-12B79877F6A0}"/>
+                <a16:creationId xmlns:a16="http://schemas.microsoft.com/office/drawing/2014/main" xmlns="" id="{3887E36E-D8A6-4282-96A2-12B79877F6A0}"/>
               </a:ext>
             </a:extLst>
           </p:cNvPr>
@@ -7876,21 +7876,21 @@
                 <a:gridCol w="1333587">
                   <a:extLst>
                     <a:ext uri="{9D8B030D-6E8A-4147-A177-3AD203B41FA5}">
-                      <a16:colId xmlns="" xmlns:a16="http://schemas.microsoft.com/office/drawing/2014/main" val="20000"/>
+                      <a16:colId xmlns:a16="http://schemas.microsoft.com/office/drawing/2014/main" xmlns="" val="20000"/>
                     </a:ext>
                   </a:extLst>
                 </a:gridCol>
                 <a:gridCol w="8288066">
                   <a:extLst>
                     <a:ext uri="{9D8B030D-6E8A-4147-A177-3AD203B41FA5}">
-                      <a16:colId xmlns="" xmlns:a16="http://schemas.microsoft.com/office/drawing/2014/main" val="20001"/>
+                      <a16:colId xmlns:a16="http://schemas.microsoft.com/office/drawing/2014/main" xmlns="" val="20001"/>
                     </a:ext>
                   </a:extLst>
                 </a:gridCol>
                 <a:gridCol w="1572211">
                   <a:extLst>
                     <a:ext uri="{9D8B030D-6E8A-4147-A177-3AD203B41FA5}">
-                      <a16:colId xmlns="" xmlns:a16="http://schemas.microsoft.com/office/drawing/2014/main" val="3467868088"/>
+                      <a16:colId xmlns:a16="http://schemas.microsoft.com/office/drawing/2014/main" xmlns="" val="3467868088"/>
                     </a:ext>
                   </a:extLst>
                 </a:gridCol>
@@ -8327,7 +8327,7 @@
                 </a:tc>
                 <a:extLst>
                   <a:ext uri="{0D108BD9-81ED-4DB2-BD59-A6C34878D82A}">
-                    <a16:rowId xmlns="" xmlns:a16="http://schemas.microsoft.com/office/drawing/2014/main" val="10002"/>
+                    <a16:rowId xmlns:a16="http://schemas.microsoft.com/office/drawing/2014/main" xmlns="" val="10002"/>
                   </a:ext>
                 </a:extLst>
               </a:tr>
@@ -8802,7 +8802,7 @@
                 </a:tc>
                 <a:extLst>
                   <a:ext uri="{0D108BD9-81ED-4DB2-BD59-A6C34878D82A}">
-                    <a16:rowId xmlns="" xmlns:a16="http://schemas.microsoft.com/office/drawing/2014/main" val="319948773"/>
+                    <a16:rowId xmlns:a16="http://schemas.microsoft.com/office/drawing/2014/main" xmlns="" val="319948773"/>
                   </a:ext>
                 </a:extLst>
               </a:tr>
@@ -9083,7 +9083,7 @@
                 </a:tc>
                 <a:extLst>
                   <a:ext uri="{0D108BD9-81ED-4DB2-BD59-A6C34878D82A}">
-                    <a16:rowId xmlns="" xmlns:a16="http://schemas.microsoft.com/office/drawing/2014/main" val="10003"/>
+                    <a16:rowId xmlns:a16="http://schemas.microsoft.com/office/drawing/2014/main" xmlns="" val="10003"/>
                   </a:ext>
                 </a:extLst>
               </a:tr>
@@ -9352,7 +9352,7 @@
                 </a:tc>
                 <a:extLst>
                   <a:ext uri="{0D108BD9-81ED-4DB2-BD59-A6C34878D82A}">
-                    <a16:rowId xmlns="" xmlns:a16="http://schemas.microsoft.com/office/drawing/2014/main" val="2380093513"/>
+                    <a16:rowId xmlns:a16="http://schemas.microsoft.com/office/drawing/2014/main" xmlns="" val="2380093513"/>
                   </a:ext>
                 </a:extLst>
               </a:tr>
@@ -9640,7 +9640,7 @@
                 </a:tc>
                 <a:extLst>
                   <a:ext uri="{0D108BD9-81ED-4DB2-BD59-A6C34878D82A}">
-                    <a16:rowId xmlns="" xmlns:a16="http://schemas.microsoft.com/office/drawing/2014/main" val="10004"/>
+                    <a16:rowId xmlns:a16="http://schemas.microsoft.com/office/drawing/2014/main" xmlns="" val="10004"/>
                   </a:ext>
                 </a:extLst>
               </a:tr>
@@ -9893,7 +9893,7 @@
                 </a:tc>
                 <a:extLst>
                   <a:ext uri="{0D108BD9-81ED-4DB2-BD59-A6C34878D82A}">
-                    <a16:rowId xmlns="" xmlns:a16="http://schemas.microsoft.com/office/drawing/2014/main" val="10005"/>
+                    <a16:rowId xmlns:a16="http://schemas.microsoft.com/office/drawing/2014/main" xmlns="" val="10005"/>
                   </a:ext>
                 </a:extLst>
               </a:tr>
@@ -9906,7 +9906,7 @@
           <p:cNvPr id="3" name="Title 2">
             <a:extLst>
               <a:ext uri="{FF2B5EF4-FFF2-40B4-BE49-F238E27FC236}">
-                <a16:creationId xmlns="" xmlns:a16="http://schemas.microsoft.com/office/drawing/2014/main" id="{688B5757-7E83-4432-BD57-D789C0CF0351}"/>
+                <a16:creationId xmlns:a16="http://schemas.microsoft.com/office/drawing/2014/main" xmlns="" id="{688B5757-7E83-4432-BD57-D789C0CF0351}"/>
               </a:ext>
             </a:extLst>
           </p:cNvPr>
@@ -9966,7 +9966,7 @@
           <p:cNvPr id="3" name="Text Placeholder 2">
             <a:extLst>
               <a:ext uri="{FF2B5EF4-FFF2-40B4-BE49-F238E27FC236}">
-                <a16:creationId xmlns="" xmlns:a16="http://schemas.microsoft.com/office/drawing/2014/main" id="{F54D4468-6ABB-459C-8B44-641B9D72E0EA}"/>
+                <a16:creationId xmlns:a16="http://schemas.microsoft.com/office/drawing/2014/main" xmlns="" id="{F54D4468-6ABB-459C-8B44-641B9D72E0EA}"/>
               </a:ext>
             </a:extLst>
           </p:cNvPr>
@@ -9999,7 +9999,7 @@
           <p:cNvPr id="6" name="Picture Placeholder 5" descr="A picture containing person, indoor, clothing, man&#10;&#10;Description automatically generated">
             <a:extLst>
               <a:ext uri="{FF2B5EF4-FFF2-40B4-BE49-F238E27FC236}">
-                <a16:creationId xmlns="" xmlns:a16="http://schemas.microsoft.com/office/drawing/2014/main" id="{D166CA1E-273D-42C9-B693-894038FE7FFD}"/>
+                <a16:creationId xmlns:a16="http://schemas.microsoft.com/office/drawing/2014/main" xmlns="" id="{D166CA1E-273D-42C9-B693-894038FE7FFD}"/>
               </a:ext>
             </a:extLst>
           </p:cNvPr>
@@ -10060,7 +10060,7 @@
           <p:cNvPr id="4" name="Title 3">
             <a:extLst>
               <a:ext uri="{FF2B5EF4-FFF2-40B4-BE49-F238E27FC236}">
-                <a16:creationId xmlns="" xmlns:a16="http://schemas.microsoft.com/office/drawing/2014/main" id="{18D613D4-C521-4429-B320-9A8E258C532E}"/>
+                <a16:creationId xmlns:a16="http://schemas.microsoft.com/office/drawing/2014/main" xmlns="" id="{18D613D4-C521-4429-B320-9A8E258C532E}"/>
               </a:ext>
             </a:extLst>
           </p:cNvPr>
@@ -10156,7 +10156,7 @@
           <p:cNvPr id="3" name="Text Placeholder 2">
             <a:extLst>
               <a:ext uri="{FF2B5EF4-FFF2-40B4-BE49-F238E27FC236}">
-                <a16:creationId xmlns="" xmlns:a16="http://schemas.microsoft.com/office/drawing/2014/main" id="{F54D4468-6ABB-459C-8B44-641B9D72E0EA}"/>
+                <a16:creationId xmlns:a16="http://schemas.microsoft.com/office/drawing/2014/main" xmlns="" id="{F54D4468-6ABB-459C-8B44-641B9D72E0EA}"/>
               </a:ext>
             </a:extLst>
           </p:cNvPr>
@@ -10268,7 +10268,7 @@
           <p:cNvPr id="4" name="Title 3">
             <a:extLst>
               <a:ext uri="{FF2B5EF4-FFF2-40B4-BE49-F238E27FC236}">
-                <a16:creationId xmlns="" xmlns:a16="http://schemas.microsoft.com/office/drawing/2014/main" id="{D68DE7CD-C7A7-4A15-ABC8-384E034E7682}"/>
+                <a16:creationId xmlns:a16="http://schemas.microsoft.com/office/drawing/2014/main" xmlns="" id="{D68DE7CD-C7A7-4A15-ABC8-384E034E7682}"/>
               </a:ext>
             </a:extLst>
           </p:cNvPr>
@@ -10303,7 +10303,7 @@
           <p:cNvPr id="6" name="Rectangle 5">
             <a:extLst>
               <a:ext uri="{FF2B5EF4-FFF2-40B4-BE49-F238E27FC236}">
-                <a16:creationId xmlns="" xmlns:a16="http://schemas.microsoft.com/office/drawing/2014/main" id="{C9A1799D-40DC-45A1-A448-3180F668976B}"/>
+                <a16:creationId xmlns:a16="http://schemas.microsoft.com/office/drawing/2014/main" xmlns="" id="{C9A1799D-40DC-45A1-A448-3180F668976B}"/>
               </a:ext>
             </a:extLst>
           </p:cNvPr>
@@ -10376,7 +10376,7 @@
           <p:cNvPr id="7" name="Rectangle 6">
             <a:extLst>
               <a:ext uri="{FF2B5EF4-FFF2-40B4-BE49-F238E27FC236}">
-                <a16:creationId xmlns="" xmlns:a16="http://schemas.microsoft.com/office/drawing/2014/main" id="{5CE97BA6-8D23-4D69-A796-6D85E2D306A4}"/>
+                <a16:creationId xmlns:a16="http://schemas.microsoft.com/office/drawing/2014/main" xmlns="" id="{5CE97BA6-8D23-4D69-A796-6D85E2D306A4}"/>
               </a:ext>
             </a:extLst>
           </p:cNvPr>
@@ -10450,7 +10450,7 @@
           <p:cNvPr id="8" name="Rectangle 7">
             <a:extLst>
               <a:ext uri="{FF2B5EF4-FFF2-40B4-BE49-F238E27FC236}">
-                <a16:creationId xmlns="" xmlns:a16="http://schemas.microsoft.com/office/drawing/2014/main" id="{4B85AC87-9CA3-4293-8EF8-CCE5120A08AE}"/>
+                <a16:creationId xmlns:a16="http://schemas.microsoft.com/office/drawing/2014/main" xmlns="" id="{4B85AC87-9CA3-4293-8EF8-CCE5120A08AE}"/>
               </a:ext>
             </a:extLst>
           </p:cNvPr>
@@ -10630,7 +10630,7 @@
           <p:cNvPr id="4" name="Title 3">
             <a:extLst>
               <a:ext uri="{FF2B5EF4-FFF2-40B4-BE49-F238E27FC236}">
-                <a16:creationId xmlns="" xmlns:a16="http://schemas.microsoft.com/office/drawing/2014/main" id="{18D613D4-C521-4429-B320-9A8E258C532E}"/>
+                <a16:creationId xmlns:a16="http://schemas.microsoft.com/office/drawing/2014/main" xmlns="" id="{18D613D4-C521-4429-B320-9A8E258C532E}"/>
               </a:ext>
             </a:extLst>
           </p:cNvPr>
@@ -10663,7 +10663,7 @@
           <p:cNvPr id="39" name="Group 38">
             <a:extLst>
               <a:ext uri="{FF2B5EF4-FFF2-40B4-BE49-F238E27FC236}">
-                <a16:creationId xmlns="" xmlns:a16="http://schemas.microsoft.com/office/drawing/2014/main" id="{02219ECA-5402-4A0E-9B87-9E12D80FBF1F}"/>
+                <a16:creationId xmlns:a16="http://schemas.microsoft.com/office/drawing/2014/main" xmlns="" id="{02219ECA-5402-4A0E-9B87-9E12D80FBF1F}"/>
               </a:ext>
             </a:extLst>
           </p:cNvPr>
@@ -10683,7 +10683,7 @@
             <p:cNvPr id="41" name="Rectangle: Rounded Corners 40">
               <a:extLst>
                 <a:ext uri="{FF2B5EF4-FFF2-40B4-BE49-F238E27FC236}">
-                  <a16:creationId xmlns="" xmlns:a16="http://schemas.microsoft.com/office/drawing/2014/main" id="{0D560CA3-43B1-4E58-8B41-26C12F3AF664}"/>
+                  <a16:creationId xmlns:a16="http://schemas.microsoft.com/office/drawing/2014/main" xmlns="" id="{0D560CA3-43B1-4E58-8B41-26C12F3AF664}"/>
                 </a:ext>
               </a:extLst>
             </p:cNvPr>
@@ -10745,7 +10745,7 @@
             <p:cNvPr id="42" name="Rectangle: Rounded Corners 41">
               <a:extLst>
                 <a:ext uri="{FF2B5EF4-FFF2-40B4-BE49-F238E27FC236}">
-                  <a16:creationId xmlns="" xmlns:a16="http://schemas.microsoft.com/office/drawing/2014/main" id="{132BB319-DFCE-4919-AC1B-59E76C2C5CFC}"/>
+                  <a16:creationId xmlns:a16="http://schemas.microsoft.com/office/drawing/2014/main" xmlns="" id="{132BB319-DFCE-4919-AC1B-59E76C2C5CFC}"/>
                 </a:ext>
               </a:extLst>
             </p:cNvPr>
@@ -10801,7 +10801,7 @@
             <p:cNvPr id="46" name="Rectangle: Rounded Corners 45">
               <a:extLst>
                 <a:ext uri="{FF2B5EF4-FFF2-40B4-BE49-F238E27FC236}">
-                  <a16:creationId xmlns="" xmlns:a16="http://schemas.microsoft.com/office/drawing/2014/main" id="{460586F4-8588-46C8-9AAC-3CFE77832890}"/>
+                  <a16:creationId xmlns:a16="http://schemas.microsoft.com/office/drawing/2014/main" xmlns="" id="{460586F4-8588-46C8-9AAC-3CFE77832890}"/>
                 </a:ext>
               </a:extLst>
             </p:cNvPr>
@@ -10863,7 +10863,7 @@
             <p:cNvPr id="47" name="Rectangle: Rounded Corners 46">
               <a:extLst>
                 <a:ext uri="{FF2B5EF4-FFF2-40B4-BE49-F238E27FC236}">
-                  <a16:creationId xmlns="" xmlns:a16="http://schemas.microsoft.com/office/drawing/2014/main" id="{41B66353-CE6C-4D00-9538-9FC8E19986CC}"/>
+                  <a16:creationId xmlns:a16="http://schemas.microsoft.com/office/drawing/2014/main" xmlns="" id="{41B66353-CE6C-4D00-9538-9FC8E19986CC}"/>
                 </a:ext>
               </a:extLst>
             </p:cNvPr>
@@ -10923,7 +10923,7 @@
             <p:cNvPr id="48" name="Rectangle: Rounded Corners 47">
               <a:extLst>
                 <a:ext uri="{FF2B5EF4-FFF2-40B4-BE49-F238E27FC236}">
-                  <a16:creationId xmlns="" xmlns:a16="http://schemas.microsoft.com/office/drawing/2014/main" id="{4D1BF6A4-95F3-42DE-AAE8-9CB2870DBA0B}"/>
+                  <a16:creationId xmlns:a16="http://schemas.microsoft.com/office/drawing/2014/main" xmlns="" id="{4D1BF6A4-95F3-42DE-AAE8-9CB2870DBA0B}"/>
                 </a:ext>
               </a:extLst>
             </p:cNvPr>
@@ -10977,7 +10977,7 @@
             <p:cNvPr id="49" name="Rectangle: Rounded Corners 48">
               <a:extLst>
                 <a:ext uri="{FF2B5EF4-FFF2-40B4-BE49-F238E27FC236}">
-                  <a16:creationId xmlns="" xmlns:a16="http://schemas.microsoft.com/office/drawing/2014/main" id="{0D129BA7-3C87-4251-8AC1-81529612D676}"/>
+                  <a16:creationId xmlns:a16="http://schemas.microsoft.com/office/drawing/2014/main" xmlns="" id="{0D129BA7-3C87-4251-8AC1-81529612D676}"/>
                 </a:ext>
               </a:extLst>
             </p:cNvPr>
@@ -11034,7 +11034,7 @@
             <p:cNvPr id="50" name="Rectangle: Rounded Corners 49">
               <a:extLst>
                 <a:ext uri="{FF2B5EF4-FFF2-40B4-BE49-F238E27FC236}">
-                  <a16:creationId xmlns="" xmlns:a16="http://schemas.microsoft.com/office/drawing/2014/main" id="{529C90E3-B118-4D63-A6B3-FB139FAB14BC}"/>
+                  <a16:creationId xmlns:a16="http://schemas.microsoft.com/office/drawing/2014/main" xmlns="" id="{529C90E3-B118-4D63-A6B3-FB139FAB14BC}"/>
                 </a:ext>
               </a:extLst>
             </p:cNvPr>
@@ -11090,7 +11090,7 @@
             <p:cNvPr id="54" name="Rectangle: Rounded Corners 53">
               <a:extLst>
                 <a:ext uri="{FF2B5EF4-FFF2-40B4-BE49-F238E27FC236}">
-                  <a16:creationId xmlns="" xmlns:a16="http://schemas.microsoft.com/office/drawing/2014/main" id="{A22F4B5C-CCEE-47FD-8E27-4CFF92287EEB}"/>
+                  <a16:creationId xmlns:a16="http://schemas.microsoft.com/office/drawing/2014/main" xmlns="" id="{A22F4B5C-CCEE-47FD-8E27-4CFF92287EEB}"/>
                 </a:ext>
               </a:extLst>
             </p:cNvPr>
@@ -11146,7 +11146,7 @@
             <p:cNvPr id="55" name="TextBox 54">
               <a:extLst>
                 <a:ext uri="{FF2B5EF4-FFF2-40B4-BE49-F238E27FC236}">
-                  <a16:creationId xmlns="" xmlns:a16="http://schemas.microsoft.com/office/drawing/2014/main" id="{00EB3EAA-3EE9-4A37-BA8C-FB8F205D04DA}"/>
+                  <a16:creationId xmlns:a16="http://schemas.microsoft.com/office/drawing/2014/main" xmlns="" id="{00EB3EAA-3EE9-4A37-BA8C-FB8F205D04DA}"/>
                 </a:ext>
               </a:extLst>
             </p:cNvPr>
@@ -11193,7 +11193,7 @@
             <p:cNvPr id="57" name="TextBox 56">
               <a:extLst>
                 <a:ext uri="{FF2B5EF4-FFF2-40B4-BE49-F238E27FC236}">
-                  <a16:creationId xmlns="" xmlns:a16="http://schemas.microsoft.com/office/drawing/2014/main" id="{FAD8207D-0C40-41EC-87C5-6FD9DF82FEB4}"/>
+                  <a16:creationId xmlns:a16="http://schemas.microsoft.com/office/drawing/2014/main" xmlns="" id="{FAD8207D-0C40-41EC-87C5-6FD9DF82FEB4}"/>
                 </a:ext>
               </a:extLst>
             </p:cNvPr>
@@ -11237,7 +11237,7 @@
             <p:cNvPr id="58" name="TextBox 57">
               <a:extLst>
                 <a:ext uri="{FF2B5EF4-FFF2-40B4-BE49-F238E27FC236}">
-                  <a16:creationId xmlns="" xmlns:a16="http://schemas.microsoft.com/office/drawing/2014/main" id="{4714BEDB-C879-40F0-88CD-EA1ED521DD4F}"/>
+                  <a16:creationId xmlns:a16="http://schemas.microsoft.com/office/drawing/2014/main" xmlns="" id="{4714BEDB-C879-40F0-88CD-EA1ED521DD4F}"/>
                 </a:ext>
               </a:extLst>
             </p:cNvPr>
@@ -11284,7 +11284,7 @@
             <p:cNvPr id="59" name="TextBox 58">
               <a:extLst>
                 <a:ext uri="{FF2B5EF4-FFF2-40B4-BE49-F238E27FC236}">
-                  <a16:creationId xmlns="" xmlns:a16="http://schemas.microsoft.com/office/drawing/2014/main" id="{2DB96F0A-E8C5-43F1-8F3B-6C5C24C706C0}"/>
+                  <a16:creationId xmlns:a16="http://schemas.microsoft.com/office/drawing/2014/main" xmlns="" id="{2DB96F0A-E8C5-43F1-8F3B-6C5C24C706C0}"/>
                 </a:ext>
               </a:extLst>
             </p:cNvPr>
@@ -11326,7 +11326,7 @@
             <p:cNvPr id="60" name="TextBox 59">
               <a:extLst>
                 <a:ext uri="{FF2B5EF4-FFF2-40B4-BE49-F238E27FC236}">
-                  <a16:creationId xmlns="" xmlns:a16="http://schemas.microsoft.com/office/drawing/2014/main" id="{9CA7B6E9-D632-42EB-9074-EB90C59F94EF}"/>
+                  <a16:creationId xmlns:a16="http://schemas.microsoft.com/office/drawing/2014/main" xmlns="" id="{9CA7B6E9-D632-42EB-9074-EB90C59F94EF}"/>
                 </a:ext>
               </a:extLst>
             </p:cNvPr>
@@ -11370,7 +11370,7 @@
             <p:cNvPr id="61" name="TextBox 60">
               <a:extLst>
                 <a:ext uri="{FF2B5EF4-FFF2-40B4-BE49-F238E27FC236}">
-                  <a16:creationId xmlns="" xmlns:a16="http://schemas.microsoft.com/office/drawing/2014/main" id="{3CDA21A6-DF49-453A-A6D6-FF3B85EB1C1E}"/>
+                  <a16:creationId xmlns:a16="http://schemas.microsoft.com/office/drawing/2014/main" xmlns="" id="{3CDA21A6-DF49-453A-A6D6-FF3B85EB1C1E}"/>
                 </a:ext>
               </a:extLst>
             </p:cNvPr>
@@ -11414,7 +11414,7 @@
             <p:cNvPr id="62" name="Graphic 61" descr="High voltage">
               <a:extLst>
                 <a:ext uri="{FF2B5EF4-FFF2-40B4-BE49-F238E27FC236}">
-                  <a16:creationId xmlns="" xmlns:a16="http://schemas.microsoft.com/office/drawing/2014/main" id="{171F65E0-1FFF-420D-9499-21AE0B8F20EA}"/>
+                  <a16:creationId xmlns:a16="http://schemas.microsoft.com/office/drawing/2014/main" xmlns="" id="{171F65E0-1FFF-420D-9499-21AE0B8F20EA}"/>
                 </a:ext>
               </a:extLst>
             </p:cNvPr>
@@ -11430,7 +11430,7 @@
                   <a14:useLocalDpi xmlns:a14="http://schemas.microsoft.com/office/drawing/2010/main"/>
                 </a:ext>
                 <a:ext uri="{96DAC541-7B7A-43D3-8B79-37D633B846F1}">
-                  <asvg:svgBlip xmlns="" xmlns:asvg="http://schemas.microsoft.com/office/drawing/2016/SVG/main" r:embed="rId3"/>
+                  <asvg:svgBlip xmlns:asvg="http://schemas.microsoft.com/office/drawing/2016/SVG/main" xmlns="" r:embed="rId3"/>
                 </a:ext>
               </a:extLst>
             </a:blip>
@@ -11453,7 +11453,7 @@
             <p:cNvPr id="63" name="Graphic 62" descr="Internet">
               <a:extLst>
                 <a:ext uri="{FF2B5EF4-FFF2-40B4-BE49-F238E27FC236}">
-                  <a16:creationId xmlns="" xmlns:a16="http://schemas.microsoft.com/office/drawing/2014/main" id="{A578A9D1-1E42-4BF4-BEDF-D612CCBF9553}"/>
+                  <a16:creationId xmlns:a16="http://schemas.microsoft.com/office/drawing/2014/main" xmlns="" id="{A578A9D1-1E42-4BF4-BEDF-D612CCBF9553}"/>
                 </a:ext>
               </a:extLst>
             </p:cNvPr>
@@ -11469,7 +11469,7 @@
                   <a14:useLocalDpi xmlns:a14="http://schemas.microsoft.com/office/drawing/2010/main"/>
                 </a:ext>
                 <a:ext uri="{96DAC541-7B7A-43D3-8B79-37D633B846F1}">
-                  <asvg:svgBlip xmlns="" xmlns:asvg="http://schemas.microsoft.com/office/drawing/2016/SVG/main" r:embed="rId5"/>
+                  <asvg:svgBlip xmlns:asvg="http://schemas.microsoft.com/office/drawing/2016/SVG/main" xmlns="" r:embed="rId5"/>
                 </a:ext>
               </a:extLst>
             </a:blip>
@@ -11492,7 +11492,7 @@
             <p:cNvPr id="64" name="Graphic 63" descr="Burger and drink">
               <a:extLst>
                 <a:ext uri="{FF2B5EF4-FFF2-40B4-BE49-F238E27FC236}">
-                  <a16:creationId xmlns="" xmlns:a16="http://schemas.microsoft.com/office/drawing/2014/main" id="{B592C4AA-B14C-48E5-82E4-4F31EE67F525}"/>
+                  <a16:creationId xmlns:a16="http://schemas.microsoft.com/office/drawing/2014/main" xmlns="" id="{B592C4AA-B14C-48E5-82E4-4F31EE67F525}"/>
                 </a:ext>
               </a:extLst>
             </p:cNvPr>
@@ -11508,7 +11508,7 @@
                   <a14:useLocalDpi xmlns:a14="http://schemas.microsoft.com/office/drawing/2010/main"/>
                 </a:ext>
                 <a:ext uri="{96DAC541-7B7A-43D3-8B79-37D633B846F1}">
-                  <asvg:svgBlip xmlns="" xmlns:asvg="http://schemas.microsoft.com/office/drawing/2016/SVG/main" r:embed="rId7"/>
+                  <asvg:svgBlip xmlns:asvg="http://schemas.microsoft.com/office/drawing/2016/SVG/main" xmlns="" r:embed="rId7"/>
                 </a:ext>
               </a:extLst>
             </a:blip>
@@ -11531,7 +11531,7 @@
             <p:cNvPr id="73" name="Graphic 72" descr="Network">
               <a:extLst>
                 <a:ext uri="{FF2B5EF4-FFF2-40B4-BE49-F238E27FC236}">
-                  <a16:creationId xmlns="" xmlns:a16="http://schemas.microsoft.com/office/drawing/2014/main" id="{6049D75C-7A09-4519-8B9C-2D63A25E6F77}"/>
+                  <a16:creationId xmlns:a16="http://schemas.microsoft.com/office/drawing/2014/main" xmlns="" id="{6049D75C-7A09-4519-8B9C-2D63A25E6F77}"/>
                 </a:ext>
               </a:extLst>
             </p:cNvPr>
@@ -11547,7 +11547,7 @@
                   <a14:useLocalDpi xmlns:a14="http://schemas.microsoft.com/office/drawing/2010/main"/>
                 </a:ext>
                 <a:ext uri="{96DAC541-7B7A-43D3-8B79-37D633B846F1}">
-                  <asvg:svgBlip xmlns="" xmlns:asvg="http://schemas.microsoft.com/office/drawing/2016/SVG/main" r:embed="rId9"/>
+                  <asvg:svgBlip xmlns:asvg="http://schemas.microsoft.com/office/drawing/2016/SVG/main" xmlns="" r:embed="rId9"/>
                 </a:ext>
               </a:extLst>
             </a:blip>
@@ -11570,7 +11570,7 @@
             <p:cNvPr id="74" name="Graphic 73" descr="Truck">
               <a:extLst>
                 <a:ext uri="{FF2B5EF4-FFF2-40B4-BE49-F238E27FC236}">
-                  <a16:creationId xmlns="" xmlns:a16="http://schemas.microsoft.com/office/drawing/2014/main" id="{6B124322-FFA3-425D-9C99-83E717941252}"/>
+                  <a16:creationId xmlns:a16="http://schemas.microsoft.com/office/drawing/2014/main" xmlns="" id="{6B124322-FFA3-425D-9C99-83E717941252}"/>
                 </a:ext>
               </a:extLst>
             </p:cNvPr>
@@ -11586,7 +11586,7 @@
                   <a14:useLocalDpi xmlns:a14="http://schemas.microsoft.com/office/drawing/2010/main"/>
                 </a:ext>
                 <a:ext uri="{96DAC541-7B7A-43D3-8B79-37D633B846F1}">
-                  <asvg:svgBlip xmlns="" xmlns:asvg="http://schemas.microsoft.com/office/drawing/2016/SVG/main" r:embed="rId11"/>
+                  <asvg:svgBlip xmlns:asvg="http://schemas.microsoft.com/office/drawing/2016/SVG/main" xmlns="" r:embed="rId11"/>
                 </a:ext>
               </a:extLst>
             </a:blip>
@@ -11609,7 +11609,7 @@
             <p:cNvPr id="75" name="Graphic 74" descr="Shopping cart">
               <a:extLst>
                 <a:ext uri="{FF2B5EF4-FFF2-40B4-BE49-F238E27FC236}">
-                  <a16:creationId xmlns="" xmlns:a16="http://schemas.microsoft.com/office/drawing/2014/main" id="{9F727B00-1624-4A05-A337-4242FEE4FCE7}"/>
+                  <a16:creationId xmlns:a16="http://schemas.microsoft.com/office/drawing/2014/main" xmlns="" id="{9F727B00-1624-4A05-A337-4242FEE4FCE7}"/>
                 </a:ext>
               </a:extLst>
             </p:cNvPr>
@@ -11625,7 +11625,7 @@
                   <a14:useLocalDpi xmlns:a14="http://schemas.microsoft.com/office/drawing/2010/main"/>
                 </a:ext>
                 <a:ext uri="{96DAC541-7B7A-43D3-8B79-37D633B846F1}">
-                  <asvg:svgBlip xmlns="" xmlns:asvg="http://schemas.microsoft.com/office/drawing/2016/SVG/main" r:embed="rId13"/>
+                  <asvg:svgBlip xmlns:asvg="http://schemas.microsoft.com/office/drawing/2016/SVG/main" xmlns="" r:embed="rId13"/>
                 </a:ext>
               </a:extLst>
             </a:blip>
@@ -11648,7 +11648,7 @@
             <p:cNvPr id="76" name="Graphic 75" descr="Fire">
               <a:extLst>
                 <a:ext uri="{FF2B5EF4-FFF2-40B4-BE49-F238E27FC236}">
-                  <a16:creationId xmlns="" xmlns:a16="http://schemas.microsoft.com/office/drawing/2014/main" id="{35E65347-7D22-471E-A9FA-32CF301BFA18}"/>
+                  <a16:creationId xmlns:a16="http://schemas.microsoft.com/office/drawing/2014/main" xmlns="" id="{35E65347-7D22-471E-A9FA-32CF301BFA18}"/>
                 </a:ext>
               </a:extLst>
             </p:cNvPr>
@@ -11664,7 +11664,7 @@
                   <a14:useLocalDpi xmlns:a14="http://schemas.microsoft.com/office/drawing/2010/main"/>
                 </a:ext>
                 <a:ext uri="{96DAC541-7B7A-43D3-8B79-37D633B846F1}">
-                  <asvg:svgBlip xmlns="" xmlns:asvg="http://schemas.microsoft.com/office/drawing/2016/SVG/main" r:embed="rId15"/>
+                  <asvg:svgBlip xmlns:asvg="http://schemas.microsoft.com/office/drawing/2016/SVG/main" xmlns="" r:embed="rId15"/>
                 </a:ext>
               </a:extLst>
             </a:blip>
@@ -11687,7 +11687,7 @@
             <p:cNvPr id="77" name="Graphic 76" descr="Factory">
               <a:extLst>
                 <a:ext uri="{FF2B5EF4-FFF2-40B4-BE49-F238E27FC236}">
-                  <a16:creationId xmlns="" xmlns:a16="http://schemas.microsoft.com/office/drawing/2014/main" id="{2C8E0786-2CF2-490E-ABF5-FF1BD43A3625}"/>
+                  <a16:creationId xmlns:a16="http://schemas.microsoft.com/office/drawing/2014/main" xmlns="" id="{2C8E0786-2CF2-490E-ABF5-FF1BD43A3625}"/>
                 </a:ext>
               </a:extLst>
             </p:cNvPr>
@@ -11703,7 +11703,7 @@
                   <a14:useLocalDpi xmlns:a14="http://schemas.microsoft.com/office/drawing/2010/main"/>
                 </a:ext>
                 <a:ext uri="{96DAC541-7B7A-43D3-8B79-37D633B846F1}">
-                  <asvg:svgBlip xmlns="" xmlns:asvg="http://schemas.microsoft.com/office/drawing/2016/SVG/main" r:embed="rId17"/>
+                  <asvg:svgBlip xmlns:asvg="http://schemas.microsoft.com/office/drawing/2016/SVG/main" xmlns="" r:embed="rId17"/>
                 </a:ext>
               </a:extLst>
             </a:blip>
@@ -11726,7 +11726,7 @@
             <p:cNvPr id="79" name="Rectangle: Rounded Corners 78">
               <a:extLst>
                 <a:ext uri="{FF2B5EF4-FFF2-40B4-BE49-F238E27FC236}">
-                  <a16:creationId xmlns="" xmlns:a16="http://schemas.microsoft.com/office/drawing/2014/main" id="{CAD9F6CC-FECF-4ADC-8255-3B4ED03035C4}"/>
+                  <a16:creationId xmlns:a16="http://schemas.microsoft.com/office/drawing/2014/main" xmlns="" id="{CAD9F6CC-FECF-4ADC-8255-3B4ED03035C4}"/>
                 </a:ext>
               </a:extLst>
             </p:cNvPr>
@@ -11783,7 +11783,7 @@
             <p:cNvPr id="80" name="Rectangle: Rounded Corners 79">
               <a:extLst>
                 <a:ext uri="{FF2B5EF4-FFF2-40B4-BE49-F238E27FC236}">
-                  <a16:creationId xmlns="" xmlns:a16="http://schemas.microsoft.com/office/drawing/2014/main" id="{24256330-49A1-45ED-93C9-708DB2579C40}"/>
+                  <a16:creationId xmlns:a16="http://schemas.microsoft.com/office/drawing/2014/main" xmlns="" id="{24256330-49A1-45ED-93C9-708DB2579C40}"/>
                 </a:ext>
               </a:extLst>
             </p:cNvPr>
@@ -11837,7 +11837,7 @@
             <p:cNvPr id="81" name="Rectangle: Rounded Corners 80">
               <a:extLst>
                 <a:ext uri="{FF2B5EF4-FFF2-40B4-BE49-F238E27FC236}">
-                  <a16:creationId xmlns="" xmlns:a16="http://schemas.microsoft.com/office/drawing/2014/main" id="{5D8EEB0E-B903-4CF6-A0C6-FF61D7F5F40D}"/>
+                  <a16:creationId xmlns:a16="http://schemas.microsoft.com/office/drawing/2014/main" xmlns="" id="{5D8EEB0E-B903-4CF6-A0C6-FF61D7F5F40D}"/>
                 </a:ext>
               </a:extLst>
             </p:cNvPr>
@@ -11891,7 +11891,7 @@
             <p:cNvPr id="82" name="Rectangle: Rounded Corners 81">
               <a:extLst>
                 <a:ext uri="{FF2B5EF4-FFF2-40B4-BE49-F238E27FC236}">
-                  <a16:creationId xmlns="" xmlns:a16="http://schemas.microsoft.com/office/drawing/2014/main" id="{F412A66F-2EAA-46F1-8702-9FAEA11C84FF}"/>
+                  <a16:creationId xmlns:a16="http://schemas.microsoft.com/office/drawing/2014/main" xmlns="" id="{F412A66F-2EAA-46F1-8702-9FAEA11C84FF}"/>
                 </a:ext>
               </a:extLst>
             </p:cNvPr>
@@ -11947,7 +11947,7 @@
             <p:cNvPr id="83" name="TextBox 82">
               <a:extLst>
                 <a:ext uri="{FF2B5EF4-FFF2-40B4-BE49-F238E27FC236}">
-                  <a16:creationId xmlns="" xmlns:a16="http://schemas.microsoft.com/office/drawing/2014/main" id="{65C60FB8-276E-47CF-A036-DFF8E5BC9551}"/>
+                  <a16:creationId xmlns:a16="http://schemas.microsoft.com/office/drawing/2014/main" xmlns="" id="{65C60FB8-276E-47CF-A036-DFF8E5BC9551}"/>
                 </a:ext>
               </a:extLst>
             </p:cNvPr>
@@ -11992,7 +11992,7 @@
             <p:cNvPr id="84" name="TextBox 83">
               <a:extLst>
                 <a:ext uri="{FF2B5EF4-FFF2-40B4-BE49-F238E27FC236}">
-                  <a16:creationId xmlns="" xmlns:a16="http://schemas.microsoft.com/office/drawing/2014/main" id="{C3381520-EFB4-4AA0-9B0C-4EF9E787F16D}"/>
+                  <a16:creationId xmlns:a16="http://schemas.microsoft.com/office/drawing/2014/main" xmlns="" id="{C3381520-EFB4-4AA0-9B0C-4EF9E787F16D}"/>
                 </a:ext>
               </a:extLst>
             </p:cNvPr>
@@ -12034,7 +12034,7 @@
             <p:cNvPr id="85" name="TextBox 84">
               <a:extLst>
                 <a:ext uri="{FF2B5EF4-FFF2-40B4-BE49-F238E27FC236}">
-                  <a16:creationId xmlns="" xmlns:a16="http://schemas.microsoft.com/office/drawing/2014/main" id="{DC79AA1D-D74B-4F98-AE6B-2AB1F39DEB55}"/>
+                  <a16:creationId xmlns:a16="http://schemas.microsoft.com/office/drawing/2014/main" xmlns="" id="{DC79AA1D-D74B-4F98-AE6B-2AB1F39DEB55}"/>
                 </a:ext>
               </a:extLst>
             </p:cNvPr>
@@ -12076,7 +12076,7 @@
             <p:cNvPr id="86" name="Graphic 85" descr="Film reel">
               <a:extLst>
                 <a:ext uri="{FF2B5EF4-FFF2-40B4-BE49-F238E27FC236}">
-                  <a16:creationId xmlns="" xmlns:a16="http://schemas.microsoft.com/office/drawing/2014/main" id="{B7C5823F-2EFC-4F2E-AA19-3B04BBA6E912}"/>
+                  <a16:creationId xmlns:a16="http://schemas.microsoft.com/office/drawing/2014/main" xmlns="" id="{B7C5823F-2EFC-4F2E-AA19-3B04BBA6E912}"/>
                 </a:ext>
               </a:extLst>
             </p:cNvPr>
@@ -12092,7 +12092,7 @@
                   <a14:useLocalDpi xmlns:a14="http://schemas.microsoft.com/office/drawing/2010/main"/>
                 </a:ext>
                 <a:ext uri="{96DAC541-7B7A-43D3-8B79-37D633B846F1}">
-                  <asvg:svgBlip xmlns="" xmlns:asvg="http://schemas.microsoft.com/office/drawing/2016/SVG/main" r:embed="rId19"/>
+                  <asvg:svgBlip xmlns:asvg="http://schemas.microsoft.com/office/drawing/2016/SVG/main" xmlns="" r:embed="rId19"/>
                 </a:ext>
               </a:extLst>
             </a:blip>
@@ -12115,7 +12115,7 @@
             <p:cNvPr id="87" name="Graphic 86" descr="Theatre">
               <a:extLst>
                 <a:ext uri="{FF2B5EF4-FFF2-40B4-BE49-F238E27FC236}">
-                  <a16:creationId xmlns="" xmlns:a16="http://schemas.microsoft.com/office/drawing/2014/main" id="{5298A890-A142-4FB9-A1C2-FAE87D214D22}"/>
+                  <a16:creationId xmlns:a16="http://schemas.microsoft.com/office/drawing/2014/main" xmlns="" id="{5298A890-A142-4FB9-A1C2-FAE87D214D22}"/>
                 </a:ext>
               </a:extLst>
             </p:cNvPr>
@@ -12131,7 +12131,7 @@
                   <a14:useLocalDpi xmlns:a14="http://schemas.microsoft.com/office/drawing/2010/main"/>
                 </a:ext>
                 <a:ext uri="{96DAC541-7B7A-43D3-8B79-37D633B846F1}">
-                  <asvg:svgBlip xmlns="" xmlns:asvg="http://schemas.microsoft.com/office/drawing/2016/SVG/main" r:embed="rId21"/>
+                  <asvg:svgBlip xmlns:asvg="http://schemas.microsoft.com/office/drawing/2016/SVG/main" xmlns="" r:embed="rId21"/>
                 </a:ext>
               </a:extLst>
             </a:blip>
@@ -12154,7 +12154,7 @@
             <p:cNvPr id="88" name="Graphic 87" descr="Money">
               <a:extLst>
                 <a:ext uri="{FF2B5EF4-FFF2-40B4-BE49-F238E27FC236}">
-                  <a16:creationId xmlns="" xmlns:a16="http://schemas.microsoft.com/office/drawing/2014/main" id="{9D84112B-E12B-41C6-B391-99BB760202A4}"/>
+                  <a16:creationId xmlns:a16="http://schemas.microsoft.com/office/drawing/2014/main" xmlns="" id="{9D84112B-E12B-41C6-B391-99BB760202A4}"/>
                 </a:ext>
               </a:extLst>
             </p:cNvPr>
@@ -12170,7 +12170,7 @@
                   <a14:useLocalDpi xmlns:a14="http://schemas.microsoft.com/office/drawing/2010/main"/>
                 </a:ext>
                 <a:ext uri="{96DAC541-7B7A-43D3-8B79-37D633B846F1}">
-                  <asvg:svgBlip xmlns="" xmlns:asvg="http://schemas.microsoft.com/office/drawing/2016/SVG/main" r:embed="rId23"/>
+                  <asvg:svgBlip xmlns:asvg="http://schemas.microsoft.com/office/drawing/2016/SVG/main" xmlns="" r:embed="rId23"/>
                 </a:ext>
               </a:extLst>
             </a:blip>
@@ -12193,7 +12193,7 @@
             <p:cNvPr id="89" name="Graphic 88" descr="Train">
               <a:extLst>
                 <a:ext uri="{FF2B5EF4-FFF2-40B4-BE49-F238E27FC236}">
-                  <a16:creationId xmlns="" xmlns:a16="http://schemas.microsoft.com/office/drawing/2014/main" id="{3A9A2E9E-BE87-48D4-8B24-D02882ADC44F}"/>
+                  <a16:creationId xmlns:a16="http://schemas.microsoft.com/office/drawing/2014/main" xmlns="" id="{3A9A2E9E-BE87-48D4-8B24-D02882ADC44F}"/>
                 </a:ext>
               </a:extLst>
             </p:cNvPr>
@@ -12209,7 +12209,7 @@
                   <a14:useLocalDpi xmlns:a14="http://schemas.microsoft.com/office/drawing/2010/main"/>
                 </a:ext>
                 <a:ext uri="{96DAC541-7B7A-43D3-8B79-37D633B846F1}">
-                  <asvg:svgBlip xmlns="" xmlns:asvg="http://schemas.microsoft.com/office/drawing/2016/SVG/main" r:embed="rId25"/>
+                  <asvg:svgBlip xmlns:asvg="http://schemas.microsoft.com/office/drawing/2016/SVG/main" xmlns="" r:embed="rId25"/>
                 </a:ext>
               </a:extLst>
             </a:blip>
@@ -12233,7 +12233,7 @@
           <p:cNvPr id="90" name="Group 89">
             <a:extLst>
               <a:ext uri="{FF2B5EF4-FFF2-40B4-BE49-F238E27FC236}">
-                <a16:creationId xmlns="" xmlns:a16="http://schemas.microsoft.com/office/drawing/2014/main" id="{F0455B7B-77F0-41A8-8F75-CFB1A1291AA7}"/>
+                <a16:creationId xmlns:a16="http://schemas.microsoft.com/office/drawing/2014/main" xmlns="" id="{F0455B7B-77F0-41A8-8F75-CFB1A1291AA7}"/>
               </a:ext>
             </a:extLst>
           </p:cNvPr>
@@ -12253,7 +12253,7 @@
             <p:cNvPr id="91" name="Rectangle: Rounded Corners 14">
               <a:extLst>
                 <a:ext uri="{FF2B5EF4-FFF2-40B4-BE49-F238E27FC236}">
-                  <a16:creationId xmlns="" xmlns:a16="http://schemas.microsoft.com/office/drawing/2014/main" id="{8ED8681E-E3FA-4F56-B962-3FD6A39AC3DF}"/>
+                  <a16:creationId xmlns:a16="http://schemas.microsoft.com/office/drawing/2014/main" xmlns="" id="{8ED8681E-E3FA-4F56-B962-3FD6A39AC3DF}"/>
                 </a:ext>
               </a:extLst>
             </p:cNvPr>
@@ -12315,7 +12315,7 @@
             <p:cNvPr id="92" name="Rectangle: Rounded Corners 18">
               <a:extLst>
                 <a:ext uri="{FF2B5EF4-FFF2-40B4-BE49-F238E27FC236}">
-                  <a16:creationId xmlns="" xmlns:a16="http://schemas.microsoft.com/office/drawing/2014/main" id="{A7CB4DDC-FA71-4C2C-9087-0490E93009B6}"/>
+                  <a16:creationId xmlns:a16="http://schemas.microsoft.com/office/drawing/2014/main" xmlns="" id="{A7CB4DDC-FA71-4C2C-9087-0490E93009B6}"/>
                 </a:ext>
               </a:extLst>
             </p:cNvPr>
@@ -12371,7 +12371,7 @@
             <p:cNvPr id="93" name="Rectangle: Rounded Corners 20">
               <a:extLst>
                 <a:ext uri="{FF2B5EF4-FFF2-40B4-BE49-F238E27FC236}">
-                  <a16:creationId xmlns="" xmlns:a16="http://schemas.microsoft.com/office/drawing/2014/main" id="{3AC7E16A-FB95-40AB-866E-54473CD42419}"/>
+                  <a16:creationId xmlns:a16="http://schemas.microsoft.com/office/drawing/2014/main" xmlns="" id="{3AC7E16A-FB95-40AB-866E-54473CD42419}"/>
                 </a:ext>
               </a:extLst>
             </p:cNvPr>
@@ -12431,7 +12431,7 @@
             <p:cNvPr id="94" name="Graphic 93" descr="Target Audience">
               <a:extLst>
                 <a:ext uri="{FF2B5EF4-FFF2-40B4-BE49-F238E27FC236}">
-                  <a16:creationId xmlns="" xmlns:a16="http://schemas.microsoft.com/office/drawing/2014/main" id="{C985881B-059B-4DD0-9072-B26FE465A6FC}"/>
+                  <a16:creationId xmlns:a16="http://schemas.microsoft.com/office/drawing/2014/main" xmlns="" id="{C985881B-059B-4DD0-9072-B26FE465A6FC}"/>
                 </a:ext>
               </a:extLst>
             </p:cNvPr>
@@ -12447,7 +12447,7 @@
                   <a14:useLocalDpi xmlns:a14="http://schemas.microsoft.com/office/drawing/2010/main"/>
                 </a:ext>
                 <a:ext uri="{96DAC541-7B7A-43D3-8B79-37D633B846F1}">
-                  <asvg:svgBlip xmlns="" xmlns:asvg="http://schemas.microsoft.com/office/drawing/2016/SVG/main" r:embed="rId27"/>
+                  <asvg:svgBlip xmlns:asvg="http://schemas.microsoft.com/office/drawing/2016/SVG/main" xmlns="" r:embed="rId27"/>
                 </a:ext>
               </a:extLst>
             </a:blip>
@@ -12470,7 +12470,7 @@
             <p:cNvPr id="95" name="Graphic 94" descr="Office worker">
               <a:extLst>
                 <a:ext uri="{FF2B5EF4-FFF2-40B4-BE49-F238E27FC236}">
-                  <a16:creationId xmlns="" xmlns:a16="http://schemas.microsoft.com/office/drawing/2014/main" id="{ACB077C4-C930-4621-B9CD-FA6E7F541234}"/>
+                  <a16:creationId xmlns:a16="http://schemas.microsoft.com/office/drawing/2014/main" xmlns="" id="{ACB077C4-C930-4621-B9CD-FA6E7F541234}"/>
                 </a:ext>
               </a:extLst>
             </p:cNvPr>
@@ -12486,7 +12486,7 @@
                   <a14:useLocalDpi xmlns:a14="http://schemas.microsoft.com/office/drawing/2010/main"/>
                 </a:ext>
                 <a:ext uri="{96DAC541-7B7A-43D3-8B79-37D633B846F1}">
-                  <asvg:svgBlip xmlns="" xmlns:asvg="http://schemas.microsoft.com/office/drawing/2016/SVG/main" r:embed="rId29"/>
+                  <asvg:svgBlip xmlns:asvg="http://schemas.microsoft.com/office/drawing/2016/SVG/main" xmlns="" r:embed="rId29"/>
                 </a:ext>
               </a:extLst>
             </a:blip>
@@ -12509,7 +12509,7 @@
             <p:cNvPr id="96" name="Rectangle: Rounded Corners 30">
               <a:extLst>
                 <a:ext uri="{FF2B5EF4-FFF2-40B4-BE49-F238E27FC236}">
-                  <a16:creationId xmlns="" xmlns:a16="http://schemas.microsoft.com/office/drawing/2014/main" id="{9B1172EB-C300-4896-8109-BF9DD22C7676}"/>
+                  <a16:creationId xmlns:a16="http://schemas.microsoft.com/office/drawing/2014/main" xmlns="" id="{9B1172EB-C300-4896-8109-BF9DD22C7676}"/>
                 </a:ext>
               </a:extLst>
             </p:cNvPr>
@@ -12566,7 +12566,7 @@
             <p:cNvPr id="97" name="Rectangle: Rounded Corners 31">
               <a:extLst>
                 <a:ext uri="{FF2B5EF4-FFF2-40B4-BE49-F238E27FC236}">
-                  <a16:creationId xmlns="" xmlns:a16="http://schemas.microsoft.com/office/drawing/2014/main" id="{9C68D4FF-F8AC-4E7C-A587-BAB7B22A216A}"/>
+                  <a16:creationId xmlns:a16="http://schemas.microsoft.com/office/drawing/2014/main" xmlns="" id="{9C68D4FF-F8AC-4E7C-A587-BAB7B22A216A}"/>
                 </a:ext>
               </a:extLst>
             </p:cNvPr>
@@ -12622,7 +12622,7 @@
             <p:cNvPr id="98" name="Rectangle: Rounded Corners 32">
               <a:extLst>
                 <a:ext uri="{FF2B5EF4-FFF2-40B4-BE49-F238E27FC236}">
-                  <a16:creationId xmlns="" xmlns:a16="http://schemas.microsoft.com/office/drawing/2014/main" id="{A1087763-2AE5-4C0D-A173-477C64DF3AA1}"/>
+                  <a16:creationId xmlns:a16="http://schemas.microsoft.com/office/drawing/2014/main" xmlns="" id="{A1087763-2AE5-4C0D-A173-477C64DF3AA1}"/>
                 </a:ext>
               </a:extLst>
             </p:cNvPr>
@@ -12678,7 +12678,7 @@
             <p:cNvPr id="99" name="TextBox 98">
               <a:extLst>
                 <a:ext uri="{FF2B5EF4-FFF2-40B4-BE49-F238E27FC236}">
-                  <a16:creationId xmlns="" xmlns:a16="http://schemas.microsoft.com/office/drawing/2014/main" id="{C61BC350-0839-481E-98B5-C78BBA2B26F1}"/>
+                  <a16:creationId xmlns:a16="http://schemas.microsoft.com/office/drawing/2014/main" xmlns="" id="{C61BC350-0839-481E-98B5-C78BBA2B26F1}"/>
                 </a:ext>
               </a:extLst>
             </p:cNvPr>
@@ -12722,7 +12722,7 @@
             <p:cNvPr id="100" name="Graphic 99" descr="Circles with arrows">
               <a:extLst>
                 <a:ext uri="{FF2B5EF4-FFF2-40B4-BE49-F238E27FC236}">
-                  <a16:creationId xmlns="" xmlns:a16="http://schemas.microsoft.com/office/drawing/2014/main" id="{1DD6105C-EB75-4F7A-83B6-D1C55E776461}"/>
+                  <a16:creationId xmlns:a16="http://schemas.microsoft.com/office/drawing/2014/main" xmlns="" id="{1DD6105C-EB75-4F7A-83B6-D1C55E776461}"/>
                 </a:ext>
               </a:extLst>
             </p:cNvPr>
@@ -12738,7 +12738,7 @@
                   <a14:useLocalDpi xmlns:a14="http://schemas.microsoft.com/office/drawing/2010/main"/>
                 </a:ext>
                 <a:ext uri="{96DAC541-7B7A-43D3-8B79-37D633B846F1}">
-                  <asvg:svgBlip xmlns="" xmlns:asvg="http://schemas.microsoft.com/office/drawing/2016/SVG/main" r:embed="rId31"/>
+                  <asvg:svgBlip xmlns:asvg="http://schemas.microsoft.com/office/drawing/2016/SVG/main" xmlns="" r:embed="rId31"/>
                 </a:ext>
               </a:extLst>
             </a:blip>
@@ -12761,7 +12761,7 @@
             <p:cNvPr id="101" name="TextBox 100">
               <a:extLst>
                 <a:ext uri="{FF2B5EF4-FFF2-40B4-BE49-F238E27FC236}">
-                  <a16:creationId xmlns="" xmlns:a16="http://schemas.microsoft.com/office/drawing/2014/main" id="{AA32ED6A-5C90-4CB7-BF30-E30C23E3A3EF}"/>
+                  <a16:creationId xmlns:a16="http://schemas.microsoft.com/office/drawing/2014/main" xmlns="" id="{AA32ED6A-5C90-4CB7-BF30-E30C23E3A3EF}"/>
                 </a:ext>
               </a:extLst>
             </p:cNvPr>
@@ -12820,7 +12820,7 @@
             <p:cNvPr id="102" name="Graphic 101" descr="Processor">
               <a:extLst>
                 <a:ext uri="{FF2B5EF4-FFF2-40B4-BE49-F238E27FC236}">
-                  <a16:creationId xmlns="" xmlns:a16="http://schemas.microsoft.com/office/drawing/2014/main" id="{CE54EF4F-814C-4442-AF07-8BBC946C527B}"/>
+                  <a16:creationId xmlns:a16="http://schemas.microsoft.com/office/drawing/2014/main" xmlns="" id="{CE54EF4F-814C-4442-AF07-8BBC946C527B}"/>
                 </a:ext>
               </a:extLst>
             </p:cNvPr>
@@ -12836,7 +12836,7 @@
                   <a14:useLocalDpi xmlns:a14="http://schemas.microsoft.com/office/drawing/2010/main"/>
                 </a:ext>
                 <a:ext uri="{96DAC541-7B7A-43D3-8B79-37D633B846F1}">
-                  <asvg:svgBlip xmlns="" xmlns:asvg="http://schemas.microsoft.com/office/drawing/2016/SVG/main" r:embed="rId33"/>
+                  <asvg:svgBlip xmlns:asvg="http://schemas.microsoft.com/office/drawing/2016/SVG/main" xmlns="" r:embed="rId33"/>
                 </a:ext>
               </a:extLst>
             </a:blip>
@@ -12859,7 +12859,7 @@
             <p:cNvPr id="103" name="Graphic 102" descr="Brain in head">
               <a:extLst>
                 <a:ext uri="{FF2B5EF4-FFF2-40B4-BE49-F238E27FC236}">
-                  <a16:creationId xmlns="" xmlns:a16="http://schemas.microsoft.com/office/drawing/2014/main" id="{96A27A7D-9B2C-4205-8A7F-987B6E6FA148}"/>
+                  <a16:creationId xmlns:a16="http://schemas.microsoft.com/office/drawing/2014/main" xmlns="" id="{96A27A7D-9B2C-4205-8A7F-987B6E6FA148}"/>
                 </a:ext>
               </a:extLst>
             </p:cNvPr>
@@ -12875,7 +12875,7 @@
                   <a14:useLocalDpi xmlns:a14="http://schemas.microsoft.com/office/drawing/2010/main"/>
                 </a:ext>
                 <a:ext uri="{96DAC541-7B7A-43D3-8B79-37D633B846F1}">
-                  <asvg:svgBlip xmlns="" xmlns:asvg="http://schemas.microsoft.com/office/drawing/2016/SVG/main" r:embed="rId35"/>
+                  <asvg:svgBlip xmlns:asvg="http://schemas.microsoft.com/office/drawing/2016/SVG/main" xmlns="" r:embed="rId35"/>
                 </a:ext>
               </a:extLst>
             </a:blip>
@@ -12898,7 +12898,7 @@
             <p:cNvPr id="104" name="TextBox 103">
               <a:extLst>
                 <a:ext uri="{FF2B5EF4-FFF2-40B4-BE49-F238E27FC236}">
-                  <a16:creationId xmlns="" xmlns:a16="http://schemas.microsoft.com/office/drawing/2014/main" id="{FDB9E2B9-9155-4B06-BB59-E746C9B2179D}"/>
+                  <a16:creationId xmlns:a16="http://schemas.microsoft.com/office/drawing/2014/main" xmlns="" id="{FDB9E2B9-9155-4B06-BB59-E746C9B2179D}"/>
                 </a:ext>
               </a:extLst>
             </p:cNvPr>
@@ -12957,7 +12957,7 @@
             <p:cNvPr id="105" name="Graphic 104" descr="Group brainstorm">
               <a:extLst>
                 <a:ext uri="{FF2B5EF4-FFF2-40B4-BE49-F238E27FC236}">
-                  <a16:creationId xmlns="" xmlns:a16="http://schemas.microsoft.com/office/drawing/2014/main" id="{8DB2A74F-F39C-408D-AA76-DBBAA2FF8A65}"/>
+                  <a16:creationId xmlns:a16="http://schemas.microsoft.com/office/drawing/2014/main" xmlns="" id="{8DB2A74F-F39C-408D-AA76-DBBAA2FF8A65}"/>
                 </a:ext>
               </a:extLst>
             </p:cNvPr>
@@ -12973,7 +12973,7 @@
                   <a14:useLocalDpi xmlns:a14="http://schemas.microsoft.com/office/drawing/2010/main"/>
                 </a:ext>
                 <a:ext uri="{96DAC541-7B7A-43D3-8B79-37D633B846F1}">
-                  <asvg:svgBlip xmlns="" xmlns:asvg="http://schemas.microsoft.com/office/drawing/2016/SVG/main" r:embed="rId37"/>
+                  <asvg:svgBlip xmlns:asvg="http://schemas.microsoft.com/office/drawing/2016/SVG/main" xmlns="" r:embed="rId37"/>
                 </a:ext>
               </a:extLst>
             </a:blip>
@@ -12997,7 +12997,7 @@
           <p:cNvPr id="106" name="Straight Connector 105">
             <a:extLst>
               <a:ext uri="{FF2B5EF4-FFF2-40B4-BE49-F238E27FC236}">
-                <a16:creationId xmlns="" xmlns:a16="http://schemas.microsoft.com/office/drawing/2014/main" id="{BC06CE5A-FCCC-4D70-AE8F-1A34DFF6F06C}"/>
+                <a16:creationId xmlns:a16="http://schemas.microsoft.com/office/drawing/2014/main" xmlns="" id="{BC06CE5A-FCCC-4D70-AE8F-1A34DFF6F06C}"/>
               </a:ext>
             </a:extLst>
           </p:cNvPr>
@@ -13043,7 +13043,7 @@
           <p:cNvPr id="107" name="Title 3">
             <a:extLst>
               <a:ext uri="{FF2B5EF4-FFF2-40B4-BE49-F238E27FC236}">
-                <a16:creationId xmlns="" xmlns:a16="http://schemas.microsoft.com/office/drawing/2014/main" id="{92B7E390-F13A-4E24-B986-72BF2BED6D5D}"/>
+                <a16:creationId xmlns:a16="http://schemas.microsoft.com/office/drawing/2014/main" xmlns="" id="{92B7E390-F13A-4E24-B986-72BF2BED6D5D}"/>
               </a:ext>
             </a:extLst>
           </p:cNvPr>
@@ -13105,7 +13105,7 @@
           <p:cNvPr id="108" name="Title 3">
             <a:extLst>
               <a:ext uri="{FF2B5EF4-FFF2-40B4-BE49-F238E27FC236}">
-                <a16:creationId xmlns="" xmlns:a16="http://schemas.microsoft.com/office/drawing/2014/main" id="{24B3A5E9-1F27-4611-83FB-CF9436B73D5E}"/>
+                <a16:creationId xmlns:a16="http://schemas.microsoft.com/office/drawing/2014/main" xmlns="" id="{24B3A5E9-1F27-4611-83FB-CF9436B73D5E}"/>
               </a:ext>
             </a:extLst>
           </p:cNvPr>
@@ -13167,7 +13167,7 @@
           <p:cNvPr id="2" name="TextBox 1">
             <a:extLst>
               <a:ext uri="{FF2B5EF4-FFF2-40B4-BE49-F238E27FC236}">
-                <a16:creationId xmlns="" xmlns:a16="http://schemas.microsoft.com/office/drawing/2014/main" id="{EEC3BFF8-498E-42C8-93E9-D08EA8B9FDD3}"/>
+                <a16:creationId xmlns:a16="http://schemas.microsoft.com/office/drawing/2014/main" xmlns="" id="{EEC3BFF8-498E-42C8-93E9-D08EA8B9FDD3}"/>
               </a:ext>
             </a:extLst>
           </p:cNvPr>
@@ -13211,7 +13211,7 @@
           <p:cNvPr id="3" name="TextBox 2">
             <a:extLst>
               <a:ext uri="{FF2B5EF4-FFF2-40B4-BE49-F238E27FC236}">
-                <a16:creationId xmlns="" xmlns:a16="http://schemas.microsoft.com/office/drawing/2014/main" id="{44ED1051-8D33-4CCB-976A-794B10DEC4CA}"/>
+                <a16:creationId xmlns:a16="http://schemas.microsoft.com/office/drawing/2014/main" xmlns="" id="{44ED1051-8D33-4CCB-976A-794B10DEC4CA}"/>
               </a:ext>
             </a:extLst>
           </p:cNvPr>
@@ -13255,7 +13255,7 @@
           <p:cNvPr id="5" name="TextBox 4">
             <a:extLst>
               <a:ext uri="{FF2B5EF4-FFF2-40B4-BE49-F238E27FC236}">
-                <a16:creationId xmlns="" xmlns:a16="http://schemas.microsoft.com/office/drawing/2014/main" id="{9B28EB64-1BD0-4C3B-80CD-970B66E3D32B}"/>
+                <a16:creationId xmlns:a16="http://schemas.microsoft.com/office/drawing/2014/main" xmlns="" id="{9B28EB64-1BD0-4C3B-80CD-970B66E3D32B}"/>
               </a:ext>
             </a:extLst>
           </p:cNvPr>
@@ -13299,7 +13299,7 @@
           <p:cNvPr id="7" name="TextBox 6">
             <a:extLst>
               <a:ext uri="{FF2B5EF4-FFF2-40B4-BE49-F238E27FC236}">
-                <a16:creationId xmlns="" xmlns:a16="http://schemas.microsoft.com/office/drawing/2014/main" id="{F462A7A9-98E0-40AD-988D-0D4AA8EB11D2}"/>
+                <a16:creationId xmlns:a16="http://schemas.microsoft.com/office/drawing/2014/main" xmlns="" id="{F462A7A9-98E0-40AD-988D-0D4AA8EB11D2}"/>
               </a:ext>
             </a:extLst>
           </p:cNvPr>
@@ -13346,7 +13346,7 @@
           <p:cNvPr id="8" name="TextBox 7">
             <a:extLst>
               <a:ext uri="{FF2B5EF4-FFF2-40B4-BE49-F238E27FC236}">
-                <a16:creationId xmlns="" xmlns:a16="http://schemas.microsoft.com/office/drawing/2014/main" id="{49636CAC-B1C2-4557-80B3-04C1CECA973A}"/>
+                <a16:creationId xmlns:a16="http://schemas.microsoft.com/office/drawing/2014/main" xmlns="" id="{49636CAC-B1C2-4557-80B3-04C1CECA973A}"/>
               </a:ext>
             </a:extLst>
           </p:cNvPr>
@@ -13405,7 +13405,7 @@
           <p:cNvPr id="9" name="TextBox 8">
             <a:extLst>
               <a:ext uri="{FF2B5EF4-FFF2-40B4-BE49-F238E27FC236}">
-                <a16:creationId xmlns="" xmlns:a16="http://schemas.microsoft.com/office/drawing/2014/main" id="{525EBBBF-9EB9-45F2-BB2C-BD17EB2DEE78}"/>
+                <a16:creationId xmlns:a16="http://schemas.microsoft.com/office/drawing/2014/main" xmlns="" id="{525EBBBF-9EB9-45F2-BB2C-BD17EB2DEE78}"/>
               </a:ext>
             </a:extLst>
           </p:cNvPr>
@@ -13479,7 +13479,7 @@
           <p:cNvPr id="3" name="Text Placeholder 2">
             <a:extLst>
               <a:ext uri="{FF2B5EF4-FFF2-40B4-BE49-F238E27FC236}">
-                <a16:creationId xmlns="" xmlns:a16="http://schemas.microsoft.com/office/drawing/2014/main" id="{F54D4468-6ABB-459C-8B44-641B9D72E0EA}"/>
+                <a16:creationId xmlns:a16="http://schemas.microsoft.com/office/drawing/2014/main" xmlns="" id="{F54D4468-6ABB-459C-8B44-641B9D72E0EA}"/>
               </a:ext>
             </a:extLst>
           </p:cNvPr>
@@ -13574,7 +13574,7 @@
           <p:cNvPr id="4" name="Title 3">
             <a:extLst>
               <a:ext uri="{FF2B5EF4-FFF2-40B4-BE49-F238E27FC236}">
-                <a16:creationId xmlns="" xmlns:a16="http://schemas.microsoft.com/office/drawing/2014/main" id="{D68DE7CD-C7A7-4A15-ABC8-384E034E7682}"/>
+                <a16:creationId xmlns:a16="http://schemas.microsoft.com/office/drawing/2014/main" xmlns="" id="{D68DE7CD-C7A7-4A15-ABC8-384E034E7682}"/>
               </a:ext>
             </a:extLst>
           </p:cNvPr>

</xml_diff>